<commit_message>
initial draft - missing plots
</commit_message>
<xml_diff>
--- a/presentation/07.pptx
+++ b/presentation/07.pptx
@@ -13,7 +13,7 @@
     <p:sldMasterId id="2147483849" r:id="rId9"/>
   </p:sldMasterIdLst>
   <p:notesMasterIdLst>
-    <p:notesMasterId r:id="rId22"/>
+    <p:notesMasterId r:id="rId18"/>
   </p:notesMasterIdLst>
   <p:sldIdLst>
     <p:sldId id="256" r:id="rId10"/>
@@ -24,10 +24,6 @@
     <p:sldId id="267" r:id="rId15"/>
     <p:sldId id="268" r:id="rId16"/>
     <p:sldId id="269" r:id="rId17"/>
-    <p:sldId id="270" r:id="rId18"/>
-    <p:sldId id="271" r:id="rId19"/>
-    <p:sldId id="272" r:id="rId20"/>
-    <p:sldId id="273" r:id="rId21"/>
   </p:sldIdLst>
   <p:sldSz cx="12187238" cy="6858000"/>
   <p:notesSz cx="7099300" cy="10234613"/>
@@ -1299,6 +1295,387 @@
     </a:lvl9pPr>
   </p:notesStyle>
 </p:notesMaster>
+</file>
+
+<file path=ppt/notesSlides/notesSlide1.xml><?xml version="1.0" encoding="utf-8"?>
+<p:notes xmlns:a="http://schemas.openxmlformats.org/drawingml/2006/main" xmlns:r="http://schemas.openxmlformats.org/officeDocument/2006/relationships" xmlns:p="http://schemas.openxmlformats.org/presentationml/2006/main">
+  <p:cSld>
+    <p:spTree>
+      <p:nvGrpSpPr>
+        <p:cNvPr id="1" name=""/>
+        <p:cNvGrpSpPr/>
+        <p:nvPr/>
+      </p:nvGrpSpPr>
+      <p:grpSpPr>
+        <a:xfrm>
+          <a:off x="0" y="0"/>
+          <a:ext cx="0" cy="0"/>
+          <a:chOff x="0" y="0"/>
+          <a:chExt cx="0" cy="0"/>
+        </a:xfrm>
+      </p:grpSpPr>
+      <p:sp>
+        <p:nvSpPr>
+          <p:cNvPr id="2" name="Slide Image Placeholder 1"/>
+          <p:cNvSpPr>
+            <a:spLocks noGrp="1" noRot="1" noChangeAspect="1"/>
+          </p:cNvSpPr>
+          <p:nvPr>
+            <p:ph type="sldImg"/>
+          </p:nvPr>
+        </p:nvSpPr>
+        <p:spPr/>
+      </p:sp>
+      <p:sp>
+        <p:nvSpPr>
+          <p:cNvPr id="3" name="Notes Placeholder 2"/>
+          <p:cNvSpPr>
+            <a:spLocks noGrp="1"/>
+          </p:cNvSpPr>
+          <p:nvPr>
+            <p:ph type="body" idx="1"/>
+          </p:nvPr>
+        </p:nvSpPr>
+        <p:spPr/>
+        <p:txBody>
+          <a:bodyPr/>
+          <a:lstStyle/>
+          <a:p>
+            <a:r>
+              <a:rPr lang="en-US" dirty="0"/>
+              <a:t>Algorithm that you consider:</a:t>
+            </a:r>
+          </a:p>
+          <a:p>
+            <a:pPr marL="171450" indent="-171450">
+              <a:buFontTx/>
+              <a:buChar char="-"/>
+            </a:pPr>
+            <a:r>
+              <a:rPr lang="en-US" dirty="0"/>
+              <a:t>State problem that it solves (input:…, output: …)</a:t>
+            </a:r>
+          </a:p>
+          <a:p>
+            <a:pPr marL="171450" indent="-171450">
+              <a:buFontTx/>
+              <a:buChar char="-"/>
+            </a:pPr>
+            <a:r>
+              <a:rPr lang="en-US" dirty="0"/>
+              <a:t>Visualize how it works</a:t>
+            </a:r>
+          </a:p>
+          <a:p>
+            <a:pPr marL="171450" indent="-171450">
+              <a:buFontTx/>
+              <a:buChar char="-"/>
+            </a:pPr>
+            <a:r>
+              <a:rPr lang="en-US" dirty="0"/>
+              <a:t>State asymptotic runtime</a:t>
+            </a:r>
+          </a:p>
+        </p:txBody>
+      </p:sp>
+      <p:sp>
+        <p:nvSpPr>
+          <p:cNvPr id="4" name="Slide Number Placeholder 3"/>
+          <p:cNvSpPr>
+            <a:spLocks noGrp="1"/>
+          </p:cNvSpPr>
+          <p:nvPr>
+            <p:ph type="sldNum" sz="quarter" idx="5"/>
+          </p:nvPr>
+        </p:nvSpPr>
+        <p:spPr/>
+        <p:txBody>
+          <a:bodyPr/>
+          <a:lstStyle/>
+          <a:p>
+            <a:fld id="{BD41A84A-8E87-4426-9AFA-011B1ECC53C8}" type="slidenum">
+              <a:rPr lang="de-CH" smtClean="0"/>
+              <a:t>2</a:t>
+            </a:fld>
+            <a:endParaRPr lang="de-CH"/>
+          </a:p>
+        </p:txBody>
+      </p:sp>
+    </p:spTree>
+    <p:extLst>
+      <p:ext uri="{BB962C8B-B14F-4D97-AF65-F5344CB8AC3E}">
+        <p14:creationId xmlns:p14="http://schemas.microsoft.com/office/powerpoint/2010/main" val="1787555774"/>
+      </p:ext>
+    </p:extLst>
+  </p:cSld>
+  <p:clrMapOvr>
+    <a:masterClrMapping/>
+  </p:clrMapOvr>
+</p:notes>
+</file>
+
+<file path=ppt/notesSlides/notesSlide2.xml><?xml version="1.0" encoding="utf-8"?>
+<p:notes xmlns:a="http://schemas.openxmlformats.org/drawingml/2006/main" xmlns:r="http://schemas.openxmlformats.org/officeDocument/2006/relationships" xmlns:p="http://schemas.openxmlformats.org/presentationml/2006/main">
+  <p:cSld>
+    <p:spTree>
+      <p:nvGrpSpPr>
+        <p:cNvPr id="1" name=""/>
+        <p:cNvGrpSpPr/>
+        <p:nvPr/>
+      </p:nvGrpSpPr>
+      <p:grpSpPr>
+        <a:xfrm>
+          <a:off x="0" y="0"/>
+          <a:ext cx="0" cy="0"/>
+          <a:chOff x="0" y="0"/>
+          <a:chExt cx="0" cy="0"/>
+        </a:xfrm>
+      </p:grpSpPr>
+      <p:sp>
+        <p:nvSpPr>
+          <p:cNvPr id="2" name="Slide Image Placeholder 1"/>
+          <p:cNvSpPr>
+            <a:spLocks noGrp="1" noRot="1" noChangeAspect="1"/>
+          </p:cNvSpPr>
+          <p:nvPr>
+            <p:ph type="sldImg"/>
+          </p:nvPr>
+        </p:nvSpPr>
+        <p:spPr/>
+      </p:sp>
+      <p:sp>
+        <p:nvSpPr>
+          <p:cNvPr id="3" name="Notes Placeholder 2"/>
+          <p:cNvSpPr>
+            <a:spLocks noGrp="1"/>
+          </p:cNvSpPr>
+          <p:nvPr>
+            <p:ph type="body" idx="1"/>
+          </p:nvPr>
+        </p:nvSpPr>
+        <p:spPr/>
+        <p:txBody>
+          <a:bodyPr/>
+          <a:lstStyle/>
+          <a:p>
+            <a:pPr marL="171450" indent="-171450">
+              <a:buFontTx/>
+              <a:buChar char="-"/>
+            </a:pPr>
+            <a:r>
+              <a:rPr lang="en-US" dirty="0"/>
+              <a:t>Cost Measures</a:t>
+            </a:r>
+          </a:p>
+          <a:p>
+            <a:pPr marL="171450" indent="-171450">
+              <a:buFontTx/>
+              <a:buChar char="-"/>
+            </a:pPr>
+            <a:r>
+              <a:rPr lang="en-US" dirty="0"/>
+              <a:t>Exact Count</a:t>
+            </a:r>
+          </a:p>
+        </p:txBody>
+      </p:sp>
+      <p:sp>
+        <p:nvSpPr>
+          <p:cNvPr id="4" name="Slide Number Placeholder 3"/>
+          <p:cNvSpPr>
+            <a:spLocks noGrp="1"/>
+          </p:cNvSpPr>
+          <p:nvPr>
+            <p:ph type="sldNum" sz="quarter" idx="5"/>
+          </p:nvPr>
+        </p:nvSpPr>
+        <p:spPr/>
+        <p:txBody>
+          <a:bodyPr/>
+          <a:lstStyle/>
+          <a:p>
+            <a:fld id="{BD41A84A-8E87-4426-9AFA-011B1ECC53C8}" type="slidenum">
+              <a:rPr lang="de-CH" smtClean="0"/>
+              <a:t>3</a:t>
+            </a:fld>
+            <a:endParaRPr lang="de-CH"/>
+          </a:p>
+        </p:txBody>
+      </p:sp>
+    </p:spTree>
+    <p:extLst>
+      <p:ext uri="{BB962C8B-B14F-4D97-AF65-F5344CB8AC3E}">
+        <p14:creationId xmlns:p14="http://schemas.microsoft.com/office/powerpoint/2010/main" val="423254829"/>
+      </p:ext>
+    </p:extLst>
+  </p:cSld>
+  <p:clrMapOvr>
+    <a:masterClrMapping/>
+  </p:clrMapOvr>
+</p:notes>
+</file>
+
+<file path=ppt/notesSlides/notesSlide3.xml><?xml version="1.0" encoding="utf-8"?>
+<p:notes xmlns:a="http://schemas.openxmlformats.org/drawingml/2006/main" xmlns:r="http://schemas.openxmlformats.org/officeDocument/2006/relationships" xmlns:p="http://schemas.openxmlformats.org/presentationml/2006/main">
+  <p:cSld>
+    <p:spTree>
+      <p:nvGrpSpPr>
+        <p:cNvPr id="1" name=""/>
+        <p:cNvGrpSpPr/>
+        <p:nvPr/>
+      </p:nvGrpSpPr>
+      <p:grpSpPr>
+        <a:xfrm>
+          <a:off x="0" y="0"/>
+          <a:ext cx="0" cy="0"/>
+          <a:chOff x="0" y="0"/>
+          <a:chExt cx="0" cy="0"/>
+        </a:xfrm>
+      </p:grpSpPr>
+      <p:sp>
+        <p:nvSpPr>
+          <p:cNvPr id="2" name="Slide Image Placeholder 1"/>
+          <p:cNvSpPr>
+            <a:spLocks noGrp="1" noRot="1" noChangeAspect="1"/>
+          </p:cNvSpPr>
+          <p:nvPr>
+            <p:ph type="sldImg"/>
+          </p:nvPr>
+        </p:nvSpPr>
+        <p:spPr/>
+      </p:sp>
+      <p:sp>
+        <p:nvSpPr>
+          <p:cNvPr id="3" name="Notes Placeholder 2"/>
+          <p:cNvSpPr>
+            <a:spLocks noGrp="1"/>
+          </p:cNvSpPr>
+          <p:nvPr>
+            <p:ph type="body" idx="1"/>
+          </p:nvPr>
+        </p:nvSpPr>
+        <p:spPr/>
+        <p:txBody>
+          <a:bodyPr/>
+          <a:lstStyle/>
+          <a:p>
+            <a:pPr marL="628650" lvl="1" indent="-171450">
+              <a:buFontTx/>
+              <a:buChar char="-"/>
+            </a:pPr>
+            <a:r>
+              <a:rPr lang="en-US" dirty="0"/>
+              <a:t>Experimental setup – platform, compiler</a:t>
+            </a:r>
+          </a:p>
+          <a:p>
+            <a:pPr marL="628650" marR="0" lvl="1" indent="-171450" algn="l" defTabSz="914400" rtl="0" eaLnBrk="1" fontAlgn="auto" latinLnBrk="0" hangingPunct="1">
+              <a:lnSpc>
+                <a:spcPct val="100000"/>
+              </a:lnSpc>
+              <a:spcBef>
+                <a:spcPts val="0"/>
+              </a:spcBef>
+              <a:spcAft>
+                <a:spcPts val="0"/>
+              </a:spcAft>
+              <a:buClrTx/>
+              <a:buSzTx/>
+              <a:buFontTx/>
+              <a:buChar char="-"/>
+              <a:tabLst/>
+              <a:defRPr/>
+            </a:pPr>
+            <a:r>
+              <a:rPr lang="en-US" dirty="0"/>
+              <a:t>Performance plot over a range of sizes with different code versions</a:t>
+            </a:r>
+          </a:p>
+          <a:p>
+            <a:pPr marL="628650" marR="0" lvl="1" indent="-171450" algn="l" defTabSz="914400" rtl="0" eaLnBrk="1" fontAlgn="auto" latinLnBrk="0" hangingPunct="1">
+              <a:lnSpc>
+                <a:spcPct val="100000"/>
+              </a:lnSpc>
+              <a:spcBef>
+                <a:spcPts val="0"/>
+              </a:spcBef>
+              <a:spcAft>
+                <a:spcPts val="0"/>
+              </a:spcAft>
+              <a:buClrTx/>
+              <a:buSzTx/>
+              <a:buFontTx/>
+              <a:buChar char="-"/>
+              <a:tabLst/>
+              <a:defRPr/>
+            </a:pPr>
+            <a:r>
+              <a:rPr lang="en-US" dirty="0"/>
+              <a:t>Push input size to the limit in the experiments</a:t>
+            </a:r>
+          </a:p>
+          <a:p>
+            <a:pPr marL="628650" marR="0" lvl="1" indent="-171450" algn="l" defTabSz="914400" rtl="0" eaLnBrk="1" fontAlgn="auto" latinLnBrk="0" hangingPunct="1">
+              <a:lnSpc>
+                <a:spcPct val="100000"/>
+              </a:lnSpc>
+              <a:spcBef>
+                <a:spcPts val="0"/>
+              </a:spcBef>
+              <a:spcAft>
+                <a:spcPts val="0"/>
+              </a:spcAft>
+              <a:buClrTx/>
+              <a:buSzTx/>
+              <a:buFontTx/>
+              <a:buChar char="-"/>
+              <a:tabLst/>
+              <a:defRPr/>
+            </a:pPr>
+            <a:r>
+              <a:rPr lang="en-US" dirty="0"/>
+              <a:t>Overall Speedup</a:t>
+            </a:r>
+          </a:p>
+          <a:p>
+            <a:endParaRPr lang="en-US" dirty="0"/>
+          </a:p>
+        </p:txBody>
+      </p:sp>
+      <p:sp>
+        <p:nvSpPr>
+          <p:cNvPr id="4" name="Slide Number Placeholder 3"/>
+          <p:cNvSpPr>
+            <a:spLocks noGrp="1"/>
+          </p:cNvSpPr>
+          <p:nvPr>
+            <p:ph type="sldNum" sz="quarter" idx="5"/>
+          </p:nvPr>
+        </p:nvSpPr>
+        <p:spPr/>
+        <p:txBody>
+          <a:bodyPr/>
+          <a:lstStyle/>
+          <a:p>
+            <a:fld id="{BD41A84A-8E87-4426-9AFA-011B1ECC53C8}" type="slidenum">
+              <a:rPr lang="de-CH" smtClean="0"/>
+              <a:t>7</a:t>
+            </a:fld>
+            <a:endParaRPr lang="de-CH"/>
+          </a:p>
+        </p:txBody>
+      </p:sp>
+    </p:spTree>
+    <p:extLst>
+      <p:ext uri="{BB962C8B-B14F-4D97-AF65-F5344CB8AC3E}">
+        <p14:creationId xmlns:p14="http://schemas.microsoft.com/office/powerpoint/2010/main" val="2763858679"/>
+      </p:ext>
+    </p:extLst>
+  </p:cSld>
+  <p:clrMapOvr>
+    <a:masterClrMapping/>
+  </p:clrMapOvr>
+</p:notes>
 </file>
 
 <file path=ppt/slideLayouts/slideLayout1.xml><?xml version="1.0" encoding="utf-8"?>
@@ -42793,42 +43170,42 @@
           <a:p>
             <a:pPr algn="ctr"/>
             <a:r>
-              <a:rPr lang="de-CH" dirty="0">
+              <a:rPr lang="de-CH" sz="3600" dirty="0">
                 <a:latin typeface="Calibri" panose="020F0502020204030204" pitchFamily="34" charset="0"/>
                 <a:cs typeface="Calibri" panose="020F0502020204030204" pitchFamily="34" charset="0"/>
               </a:rPr>
               <a:t>A SIFT </a:t>
             </a:r>
             <a:r>
-              <a:rPr lang="de-CH" dirty="0" err="1">
+              <a:rPr lang="de-CH" sz="3600" dirty="0" err="1">
                 <a:latin typeface="Calibri" panose="020F0502020204030204" pitchFamily="34" charset="0"/>
                 <a:cs typeface="Calibri" panose="020F0502020204030204" pitchFamily="34" charset="0"/>
               </a:rPr>
               <a:t>Descriptor</a:t>
             </a:r>
             <a:r>
-              <a:rPr lang="de-CH" dirty="0">
+              <a:rPr lang="de-CH" sz="3600" dirty="0">
                 <a:latin typeface="Calibri" panose="020F0502020204030204" pitchFamily="34" charset="0"/>
                 <a:cs typeface="Calibri" panose="020F0502020204030204" pitchFamily="34" charset="0"/>
               </a:rPr>
               <a:t> </a:t>
             </a:r>
             <a:r>
-              <a:rPr lang="de-CH" dirty="0" err="1">
+              <a:rPr lang="de-CH" sz="3600" dirty="0" err="1">
                 <a:latin typeface="Calibri" panose="020F0502020204030204" pitchFamily="34" charset="0"/>
                 <a:cs typeface="Calibri" panose="020F0502020204030204" pitchFamily="34" charset="0"/>
               </a:rPr>
               <a:t>for</a:t>
             </a:r>
             <a:r>
-              <a:rPr lang="de-CH" dirty="0">
+              <a:rPr lang="de-CH" sz="3600" dirty="0">
                 <a:latin typeface="Calibri" panose="020F0502020204030204" pitchFamily="34" charset="0"/>
                 <a:cs typeface="Calibri" panose="020F0502020204030204" pitchFamily="34" charset="0"/>
               </a:rPr>
               <a:t> Feature </a:t>
             </a:r>
             <a:r>
-              <a:rPr lang="de-CH" dirty="0" err="1">
+              <a:rPr lang="de-CH" sz="3600" dirty="0" err="1">
                 <a:latin typeface="Calibri" panose="020F0502020204030204" pitchFamily="34" charset="0"/>
                 <a:cs typeface="Calibri" panose="020F0502020204030204" pitchFamily="34" charset="0"/>
               </a:rPr>
@@ -42948,441 +43325,6 @@
 </p:sld>
 </file>
 
-<file path=ppt/slides/slide10.xml><?xml version="1.0" encoding="utf-8"?>
-<p:sld xmlns:a="http://schemas.openxmlformats.org/drawingml/2006/main" xmlns:r="http://schemas.openxmlformats.org/officeDocument/2006/relationships" xmlns:p="http://schemas.openxmlformats.org/presentationml/2006/main">
-  <p:cSld>
-    <p:spTree>
-      <p:nvGrpSpPr>
-        <p:cNvPr id="1" name=""/>
-        <p:cNvGrpSpPr/>
-        <p:nvPr/>
-      </p:nvGrpSpPr>
-      <p:grpSpPr>
-        <a:xfrm>
-          <a:off x="0" y="0"/>
-          <a:ext cx="0" cy="0"/>
-          <a:chOff x="0" y="0"/>
-          <a:chExt cx="0" cy="0"/>
-        </a:xfrm>
-      </p:grpSpPr>
-      <p:sp>
-        <p:nvSpPr>
-          <p:cNvPr id="2" name="Date Placeholder 1">
-            <a:extLst>
-              <a:ext uri="{FF2B5EF4-FFF2-40B4-BE49-F238E27FC236}">
-                <a16:creationId xmlns:a16="http://schemas.microsoft.com/office/drawing/2014/main" id="{5F020B42-7925-4441-B561-2E2DDB19617B}"/>
-              </a:ext>
-            </a:extLst>
-          </p:cNvPr>
-          <p:cNvSpPr>
-            <a:spLocks noGrp="1"/>
-          </p:cNvSpPr>
-          <p:nvPr>
-            <p:ph type="dt" sz="half" idx="10"/>
-          </p:nvPr>
-        </p:nvSpPr>
-        <p:spPr/>
-        <p:txBody>
-          <a:bodyPr/>
-          <a:lstStyle/>
-          <a:p>
-            <a:fld id="{5DAAA6BA-0F4E-49B5-BB9C-DAC12EFCD836}" type="datetime1">
-              <a:rPr lang="de-DE" smtClean="0"/>
-              <a:t>21.05.20</a:t>
-            </a:fld>
-            <a:endParaRPr lang="en-GB" dirty="0"/>
-          </a:p>
-        </p:txBody>
-      </p:sp>
-      <p:sp>
-        <p:nvSpPr>
-          <p:cNvPr id="3" name="Footer Placeholder 2">
-            <a:extLst>
-              <a:ext uri="{FF2B5EF4-FFF2-40B4-BE49-F238E27FC236}">
-                <a16:creationId xmlns:a16="http://schemas.microsoft.com/office/drawing/2014/main" id="{A7AE7A0B-E75C-C84F-A55A-80757A635160}"/>
-              </a:ext>
-            </a:extLst>
-          </p:cNvPr>
-          <p:cNvSpPr>
-            <a:spLocks noGrp="1"/>
-          </p:cNvSpPr>
-          <p:nvPr>
-            <p:ph type="ftr" sz="quarter" idx="11"/>
-          </p:nvPr>
-        </p:nvSpPr>
-        <p:spPr/>
-        <p:txBody>
-          <a:bodyPr/>
-          <a:lstStyle/>
-          <a:p>
-            <a:r>
-              <a:rPr lang="en-GB"/>
-              <a:t>Team 007</a:t>
-            </a:r>
-            <a:endParaRPr lang="en-GB" dirty="0"/>
-          </a:p>
-        </p:txBody>
-      </p:sp>
-      <p:sp>
-        <p:nvSpPr>
-          <p:cNvPr id="4" name="Slide Number Placeholder 3">
-            <a:extLst>
-              <a:ext uri="{FF2B5EF4-FFF2-40B4-BE49-F238E27FC236}">
-                <a16:creationId xmlns:a16="http://schemas.microsoft.com/office/drawing/2014/main" id="{C7DAC728-95F9-4244-889C-F48B1B53905F}"/>
-              </a:ext>
-            </a:extLst>
-          </p:cNvPr>
-          <p:cNvSpPr>
-            <a:spLocks noGrp="1"/>
-          </p:cNvSpPr>
-          <p:nvPr>
-            <p:ph type="sldNum" sz="quarter" idx="12"/>
-          </p:nvPr>
-        </p:nvSpPr>
-        <p:spPr/>
-        <p:txBody>
-          <a:bodyPr/>
-          <a:lstStyle/>
-          <a:p>
-            <a:fld id="{6C6AE60A-B69C-4790-82F7-3882EDF23186}" type="slidenum">
-              <a:rPr lang="en-GB" smtClean="0"/>
-              <a:t>10</a:t>
-            </a:fld>
-            <a:endParaRPr lang="en-GB" dirty="0"/>
-          </a:p>
-        </p:txBody>
-      </p:sp>
-      <p:sp>
-        <p:nvSpPr>
-          <p:cNvPr id="5" name="Title 4">
-            <a:extLst>
-              <a:ext uri="{FF2B5EF4-FFF2-40B4-BE49-F238E27FC236}">
-                <a16:creationId xmlns:a16="http://schemas.microsoft.com/office/drawing/2014/main" id="{4621CBD8-8FE8-5743-9331-9F51A87B57FF}"/>
-              </a:ext>
-            </a:extLst>
-          </p:cNvPr>
-          <p:cNvSpPr>
-            <a:spLocks noGrp="1"/>
-          </p:cNvSpPr>
-          <p:nvPr>
-            <p:ph type="title"/>
-          </p:nvPr>
-        </p:nvSpPr>
-        <p:spPr/>
-        <p:txBody>
-          <a:bodyPr/>
-          <a:lstStyle/>
-          <a:p>
-            <a:endParaRPr lang="en-US"/>
-          </a:p>
-        </p:txBody>
-      </p:sp>
-    </p:spTree>
-    <p:extLst>
-      <p:ext uri="{BB962C8B-B14F-4D97-AF65-F5344CB8AC3E}">
-        <p14:creationId xmlns:p14="http://schemas.microsoft.com/office/powerpoint/2010/main" val="2335512174"/>
-      </p:ext>
-    </p:extLst>
-  </p:cSld>
-  <p:clrMapOvr>
-    <a:masterClrMapping/>
-  </p:clrMapOvr>
-  <p:transition>
-    <p:fade/>
-  </p:transition>
-</p:sld>
-</file>
-
-<file path=ppt/slides/slide11.xml><?xml version="1.0" encoding="utf-8"?>
-<p:sld xmlns:a="http://schemas.openxmlformats.org/drawingml/2006/main" xmlns:r="http://schemas.openxmlformats.org/officeDocument/2006/relationships" xmlns:p="http://schemas.openxmlformats.org/presentationml/2006/main">
-  <p:cSld>
-    <p:spTree>
-      <p:nvGrpSpPr>
-        <p:cNvPr id="1" name=""/>
-        <p:cNvGrpSpPr/>
-        <p:nvPr/>
-      </p:nvGrpSpPr>
-      <p:grpSpPr>
-        <a:xfrm>
-          <a:off x="0" y="0"/>
-          <a:ext cx="0" cy="0"/>
-          <a:chOff x="0" y="0"/>
-          <a:chExt cx="0" cy="0"/>
-        </a:xfrm>
-      </p:grpSpPr>
-      <p:sp>
-        <p:nvSpPr>
-          <p:cNvPr id="2" name="Date Placeholder 1">
-            <a:extLst>
-              <a:ext uri="{FF2B5EF4-FFF2-40B4-BE49-F238E27FC236}">
-                <a16:creationId xmlns:a16="http://schemas.microsoft.com/office/drawing/2014/main" id="{DE92AFF4-BB96-EE4B-90BE-DBDB04C378CD}"/>
-              </a:ext>
-            </a:extLst>
-          </p:cNvPr>
-          <p:cNvSpPr>
-            <a:spLocks noGrp="1"/>
-          </p:cNvSpPr>
-          <p:nvPr>
-            <p:ph type="dt" sz="half" idx="10"/>
-          </p:nvPr>
-        </p:nvSpPr>
-        <p:spPr/>
-        <p:txBody>
-          <a:bodyPr/>
-          <a:lstStyle/>
-          <a:p>
-            <a:fld id="{5DAAA6BA-0F4E-49B5-BB9C-DAC12EFCD836}" type="datetime1">
-              <a:rPr lang="de-DE" smtClean="0"/>
-              <a:t>21.05.20</a:t>
-            </a:fld>
-            <a:endParaRPr lang="en-GB" dirty="0"/>
-          </a:p>
-        </p:txBody>
-      </p:sp>
-      <p:sp>
-        <p:nvSpPr>
-          <p:cNvPr id="3" name="Footer Placeholder 2">
-            <a:extLst>
-              <a:ext uri="{FF2B5EF4-FFF2-40B4-BE49-F238E27FC236}">
-                <a16:creationId xmlns:a16="http://schemas.microsoft.com/office/drawing/2014/main" id="{2A17DB9F-373F-4B47-99B9-861F62802A7A}"/>
-              </a:ext>
-            </a:extLst>
-          </p:cNvPr>
-          <p:cNvSpPr>
-            <a:spLocks noGrp="1"/>
-          </p:cNvSpPr>
-          <p:nvPr>
-            <p:ph type="ftr" sz="quarter" idx="11"/>
-          </p:nvPr>
-        </p:nvSpPr>
-        <p:spPr/>
-        <p:txBody>
-          <a:bodyPr/>
-          <a:lstStyle/>
-          <a:p>
-            <a:r>
-              <a:rPr lang="en-GB"/>
-              <a:t>Team 007</a:t>
-            </a:r>
-            <a:endParaRPr lang="en-GB" dirty="0"/>
-          </a:p>
-        </p:txBody>
-      </p:sp>
-      <p:sp>
-        <p:nvSpPr>
-          <p:cNvPr id="4" name="Slide Number Placeholder 3">
-            <a:extLst>
-              <a:ext uri="{FF2B5EF4-FFF2-40B4-BE49-F238E27FC236}">
-                <a16:creationId xmlns:a16="http://schemas.microsoft.com/office/drawing/2014/main" id="{E291F39B-C86C-6244-8BB3-3630D80B2F7C}"/>
-              </a:ext>
-            </a:extLst>
-          </p:cNvPr>
-          <p:cNvSpPr>
-            <a:spLocks noGrp="1"/>
-          </p:cNvSpPr>
-          <p:nvPr>
-            <p:ph type="sldNum" sz="quarter" idx="12"/>
-          </p:nvPr>
-        </p:nvSpPr>
-        <p:spPr/>
-        <p:txBody>
-          <a:bodyPr/>
-          <a:lstStyle/>
-          <a:p>
-            <a:fld id="{6C6AE60A-B69C-4790-82F7-3882EDF23186}" type="slidenum">
-              <a:rPr lang="en-GB" smtClean="0"/>
-              <a:t>11</a:t>
-            </a:fld>
-            <a:endParaRPr lang="en-GB" dirty="0"/>
-          </a:p>
-        </p:txBody>
-      </p:sp>
-      <p:sp>
-        <p:nvSpPr>
-          <p:cNvPr id="5" name="Title 4">
-            <a:extLst>
-              <a:ext uri="{FF2B5EF4-FFF2-40B4-BE49-F238E27FC236}">
-                <a16:creationId xmlns:a16="http://schemas.microsoft.com/office/drawing/2014/main" id="{C3F6D161-3682-BC46-BCC6-BCCF0EA1B6FB}"/>
-              </a:ext>
-            </a:extLst>
-          </p:cNvPr>
-          <p:cNvSpPr>
-            <a:spLocks noGrp="1"/>
-          </p:cNvSpPr>
-          <p:nvPr>
-            <p:ph type="title"/>
-          </p:nvPr>
-        </p:nvSpPr>
-        <p:spPr/>
-        <p:txBody>
-          <a:bodyPr/>
-          <a:lstStyle/>
-          <a:p>
-            <a:endParaRPr lang="en-US"/>
-          </a:p>
-        </p:txBody>
-      </p:sp>
-    </p:spTree>
-    <p:extLst>
-      <p:ext uri="{BB962C8B-B14F-4D97-AF65-F5344CB8AC3E}">
-        <p14:creationId xmlns:p14="http://schemas.microsoft.com/office/powerpoint/2010/main" val="77168079"/>
-      </p:ext>
-    </p:extLst>
-  </p:cSld>
-  <p:clrMapOvr>
-    <a:masterClrMapping/>
-  </p:clrMapOvr>
-  <p:transition>
-    <p:fade/>
-  </p:transition>
-</p:sld>
-</file>
-
-<file path=ppt/slides/slide12.xml><?xml version="1.0" encoding="utf-8"?>
-<p:sld xmlns:a="http://schemas.openxmlformats.org/drawingml/2006/main" xmlns:r="http://schemas.openxmlformats.org/officeDocument/2006/relationships" xmlns:p="http://schemas.openxmlformats.org/presentationml/2006/main">
-  <p:cSld>
-    <p:spTree>
-      <p:nvGrpSpPr>
-        <p:cNvPr id="1" name=""/>
-        <p:cNvGrpSpPr/>
-        <p:nvPr/>
-      </p:nvGrpSpPr>
-      <p:grpSpPr>
-        <a:xfrm>
-          <a:off x="0" y="0"/>
-          <a:ext cx="0" cy="0"/>
-          <a:chOff x="0" y="0"/>
-          <a:chExt cx="0" cy="0"/>
-        </a:xfrm>
-      </p:grpSpPr>
-      <p:sp>
-        <p:nvSpPr>
-          <p:cNvPr id="2" name="Date Placeholder 1">
-            <a:extLst>
-              <a:ext uri="{FF2B5EF4-FFF2-40B4-BE49-F238E27FC236}">
-                <a16:creationId xmlns:a16="http://schemas.microsoft.com/office/drawing/2014/main" id="{63675399-DC1B-1A4A-AFB7-C8FF7D1A2443}"/>
-              </a:ext>
-            </a:extLst>
-          </p:cNvPr>
-          <p:cNvSpPr>
-            <a:spLocks noGrp="1"/>
-          </p:cNvSpPr>
-          <p:nvPr>
-            <p:ph type="dt" sz="half" idx="10"/>
-          </p:nvPr>
-        </p:nvSpPr>
-        <p:spPr/>
-        <p:txBody>
-          <a:bodyPr/>
-          <a:lstStyle/>
-          <a:p>
-            <a:fld id="{5DAAA6BA-0F4E-49B5-BB9C-DAC12EFCD836}" type="datetime1">
-              <a:rPr lang="de-DE" smtClean="0"/>
-              <a:t>21.05.20</a:t>
-            </a:fld>
-            <a:endParaRPr lang="en-GB" dirty="0"/>
-          </a:p>
-        </p:txBody>
-      </p:sp>
-      <p:sp>
-        <p:nvSpPr>
-          <p:cNvPr id="3" name="Footer Placeholder 2">
-            <a:extLst>
-              <a:ext uri="{FF2B5EF4-FFF2-40B4-BE49-F238E27FC236}">
-                <a16:creationId xmlns:a16="http://schemas.microsoft.com/office/drawing/2014/main" id="{1533D78B-D67B-8C44-9A87-8873E1CCB4FE}"/>
-              </a:ext>
-            </a:extLst>
-          </p:cNvPr>
-          <p:cNvSpPr>
-            <a:spLocks noGrp="1"/>
-          </p:cNvSpPr>
-          <p:nvPr>
-            <p:ph type="ftr" sz="quarter" idx="11"/>
-          </p:nvPr>
-        </p:nvSpPr>
-        <p:spPr/>
-        <p:txBody>
-          <a:bodyPr/>
-          <a:lstStyle/>
-          <a:p>
-            <a:r>
-              <a:rPr lang="en-GB"/>
-              <a:t>Team 007</a:t>
-            </a:r>
-            <a:endParaRPr lang="en-GB" dirty="0"/>
-          </a:p>
-        </p:txBody>
-      </p:sp>
-      <p:sp>
-        <p:nvSpPr>
-          <p:cNvPr id="4" name="Slide Number Placeholder 3">
-            <a:extLst>
-              <a:ext uri="{FF2B5EF4-FFF2-40B4-BE49-F238E27FC236}">
-                <a16:creationId xmlns:a16="http://schemas.microsoft.com/office/drawing/2014/main" id="{1F187495-A1BF-A04D-ADCF-4DE3BF96C24D}"/>
-              </a:ext>
-            </a:extLst>
-          </p:cNvPr>
-          <p:cNvSpPr>
-            <a:spLocks noGrp="1"/>
-          </p:cNvSpPr>
-          <p:nvPr>
-            <p:ph type="sldNum" sz="quarter" idx="12"/>
-          </p:nvPr>
-        </p:nvSpPr>
-        <p:spPr/>
-        <p:txBody>
-          <a:bodyPr/>
-          <a:lstStyle/>
-          <a:p>
-            <a:fld id="{6C6AE60A-B69C-4790-82F7-3882EDF23186}" type="slidenum">
-              <a:rPr lang="en-GB" smtClean="0"/>
-              <a:t>12</a:t>
-            </a:fld>
-            <a:endParaRPr lang="en-GB" dirty="0"/>
-          </a:p>
-        </p:txBody>
-      </p:sp>
-      <p:sp>
-        <p:nvSpPr>
-          <p:cNvPr id="5" name="Title 4">
-            <a:extLst>
-              <a:ext uri="{FF2B5EF4-FFF2-40B4-BE49-F238E27FC236}">
-                <a16:creationId xmlns:a16="http://schemas.microsoft.com/office/drawing/2014/main" id="{F6DF3803-954B-8942-A657-933156EDC929}"/>
-              </a:ext>
-            </a:extLst>
-          </p:cNvPr>
-          <p:cNvSpPr>
-            <a:spLocks noGrp="1"/>
-          </p:cNvSpPr>
-          <p:nvPr>
-            <p:ph type="title"/>
-          </p:nvPr>
-        </p:nvSpPr>
-        <p:spPr/>
-        <p:txBody>
-          <a:bodyPr/>
-          <a:lstStyle/>
-          <a:p>
-            <a:endParaRPr lang="en-US"/>
-          </a:p>
-        </p:txBody>
-      </p:sp>
-    </p:spTree>
-    <p:extLst>
-      <p:ext uri="{BB962C8B-B14F-4D97-AF65-F5344CB8AC3E}">
-        <p14:creationId xmlns:p14="http://schemas.microsoft.com/office/powerpoint/2010/main" val="105409797"/>
-      </p:ext>
-    </p:extLst>
-  </p:cSld>
-  <p:clrMapOvr>
-    <a:masterClrMapping/>
-  </p:clrMapOvr>
-  <p:transition>
-    <p:fade/>
-  </p:transition>
-</p:sld>
-</file>
-
 <file path=ppt/slides/slide2.xml><?xml version="1.0" encoding="utf-8"?>
 <p:sld xmlns:a="http://schemas.openxmlformats.org/drawingml/2006/main" xmlns:r="http://schemas.openxmlformats.org/officeDocument/2006/relationships" xmlns:p="http://schemas.openxmlformats.org/presentationml/2006/main">
   <p:cSld>
@@ -43508,18 +43450,30 @@
           <a:lstStyle/>
           <a:p>
             <a:r>
-              <a:rPr lang="de-CH" dirty="0" err="1"/>
+              <a:rPr lang="de-CH" sz="3200" dirty="0" err="1">
+                <a:latin typeface="Calibri" panose="020F0502020204030204" pitchFamily="34" charset="0"/>
+                <a:cs typeface="Calibri" panose="020F0502020204030204" pitchFamily="34" charset="0"/>
+              </a:rPr>
               <a:t>Our</a:t>
             </a:r>
             <a:r>
-              <a:rPr lang="de-CH" dirty="0"/>
+              <a:rPr lang="de-CH" sz="3200" dirty="0">
+                <a:latin typeface="Calibri" panose="020F0502020204030204" pitchFamily="34" charset="0"/>
+                <a:cs typeface="Calibri" panose="020F0502020204030204" pitchFamily="34" charset="0"/>
+              </a:rPr>
               <a:t> </a:t>
             </a:r>
             <a:r>
-              <a:rPr lang="de-CH" dirty="0" err="1"/>
+              <a:rPr lang="de-CH" sz="3200" dirty="0" err="1">
+                <a:latin typeface="Calibri" panose="020F0502020204030204" pitchFamily="34" charset="0"/>
+                <a:cs typeface="Calibri" panose="020F0502020204030204" pitchFamily="34" charset="0"/>
+              </a:rPr>
               <a:t>Algorithm</a:t>
             </a:r>
-            <a:endParaRPr lang="de-CH" dirty="0"/>
+            <a:endParaRPr lang="de-CH" sz="3200" dirty="0">
+              <a:latin typeface="Calibri" panose="020F0502020204030204" pitchFamily="34" charset="0"/>
+              <a:cs typeface="Calibri" panose="020F0502020204030204" pitchFamily="34" charset="0"/>
+            </a:endParaRPr>
           </a:p>
         </p:txBody>
       </p:sp>
@@ -43538,7 +43492,7 @@
           <p:nvPr/>
         </p:nvPicPr>
         <p:blipFill>
-          <a:blip r:embed="rId2">
+          <a:blip r:embed="rId3">
             <a:extLst>
               <a:ext uri="{28A0092B-C50C-407E-A947-70E740481C1C}">
                 <a14:useLocalDpi xmlns:a14="http://schemas.microsoft.com/office/drawing/2010/main" val="0"/>
@@ -44032,7 +43986,7 @@
           <p:nvPr/>
         </p:nvPicPr>
         <p:blipFill>
-          <a:blip r:embed="rId3">
+          <a:blip r:embed="rId4">
             <a:extLst>
               <a:ext uri="{28A0092B-C50C-407E-A947-70E740481C1C}">
                 <a14:useLocalDpi xmlns:a14="http://schemas.microsoft.com/office/drawing/2010/main" val="0"/>
@@ -44350,7 +44304,7 @@
           <p:nvPr/>
         </p:nvPicPr>
         <p:blipFill>
-          <a:blip r:embed="rId4"/>
+          <a:blip r:embed="rId5"/>
           <a:stretch>
             <a:fillRect/>
           </a:stretch>
@@ -44380,7 +44334,7 @@
           <p:nvPr/>
         </p:nvPicPr>
         <p:blipFill>
-          <a:blip r:embed="rId5"/>
+          <a:blip r:embed="rId6"/>
           <a:stretch>
             <a:fillRect/>
           </a:stretch>
@@ -44410,7 +44364,7 @@
           <p:nvPr/>
         </p:nvPicPr>
         <p:blipFill>
-          <a:blip r:embed="rId6"/>
+          <a:blip r:embed="rId7"/>
           <a:stretch>
             <a:fillRect/>
           </a:stretch>
@@ -44451,7 +44405,7 @@
             </p:xfrm>
             <a:graphic>
               <a:graphicData uri="http://schemas.microsoft.com/office/drawing/2014/chartex">
-                <cx:chart xmlns:cx="http://schemas.microsoft.com/office/drawing/2014/chartex" xmlns:r="http://schemas.openxmlformats.org/officeDocument/2006/relationships" r:id="rId7"/>
+                <cx:chart xmlns:cx="http://schemas.microsoft.com/office/drawing/2014/chartex" xmlns:r="http://schemas.openxmlformats.org/officeDocument/2006/relationships" r:id="rId8"/>
               </a:graphicData>
             </a:graphic>
           </p:graphicFrame>
@@ -44472,7 +44426,7 @@
               <p:nvPr/>
             </p:nvPicPr>
             <p:blipFill>
-              <a:blip r:embed="rId8"/>
+              <a:blip r:embed="rId9"/>
               <a:stretch>
                 <a:fillRect/>
               </a:stretch>
@@ -44654,6 +44608,45 @@
           </a:fontRef>
         </p:style>
       </p:cxnSp>
+      <p:sp>
+        <p:nvSpPr>
+          <p:cNvPr id="6" name="TextBox 5">
+            <a:extLst>
+              <a:ext uri="{FF2B5EF4-FFF2-40B4-BE49-F238E27FC236}">
+                <a16:creationId xmlns:a16="http://schemas.microsoft.com/office/drawing/2014/main" id="{D62D0DA2-C554-1F43-812B-A8CFD9B8AB34}"/>
+              </a:ext>
+            </a:extLst>
+          </p:cNvPr>
+          <p:cNvSpPr txBox="1"/>
+          <p:nvPr/>
+        </p:nvSpPr>
+        <p:spPr>
+          <a:xfrm>
+            <a:off x="9427031" y="1185734"/>
+            <a:ext cx="2598530" cy="646331"/>
+          </a:xfrm>
+          <a:prstGeom prst="rect">
+            <a:avLst/>
+          </a:prstGeom>
+          <a:noFill/>
+        </p:spPr>
+        <p:txBody>
+          <a:bodyPr wrap="square" rtlCol="0">
+            <a:spAutoFit/>
+          </a:bodyPr>
+          <a:lstStyle/>
+          <a:p>
+            <a:pPr algn="ctr"/>
+            <a:r>
+              <a:rPr lang="en-US" dirty="0">
+                <a:latin typeface="Calibri" panose="020F0502020204030204" pitchFamily="34" charset="0"/>
+                <a:cs typeface="Calibri" panose="020F0502020204030204" pitchFamily="34" charset="0"/>
+              </a:rPr>
+              <a:t>Asymptotic runtime: O(xxx)</a:t>
+            </a:r>
+          </a:p>
+        </p:txBody>
+      </p:sp>
     </p:spTree>
     <p:extLst>
       <p:ext uri="{BB962C8B-B14F-4D97-AF65-F5344CB8AC3E}">
@@ -44795,7 +44788,162 @@
           <a:bodyPr/>
           <a:lstStyle/>
           <a:p>
-            <a:endParaRPr lang="en-US"/>
+            <a:r>
+              <a:rPr lang="en-US" sz="3200" dirty="0">
+                <a:latin typeface="Calibri" panose="020F0502020204030204" pitchFamily="34" charset="0"/>
+                <a:cs typeface="Calibri" panose="020F0502020204030204" pitchFamily="34" charset="0"/>
+              </a:rPr>
+              <a:t>Cost Analysis and Profiling</a:t>
+            </a:r>
+          </a:p>
+        </p:txBody>
+      </p:sp>
+      <p:sp>
+        <p:nvSpPr>
+          <p:cNvPr id="6" name="TextBox 5">
+            <a:extLst>
+              <a:ext uri="{FF2B5EF4-FFF2-40B4-BE49-F238E27FC236}">
+                <a16:creationId xmlns:a16="http://schemas.microsoft.com/office/drawing/2014/main" id="{8561A7D0-C408-394C-A700-0FD0AA0FC362}"/>
+              </a:ext>
+            </a:extLst>
+          </p:cNvPr>
+          <p:cNvSpPr txBox="1"/>
+          <p:nvPr/>
+        </p:nvSpPr>
+        <p:spPr>
+          <a:xfrm>
+            <a:off x="323850" y="1592714"/>
+            <a:ext cx="4153701" cy="369332"/>
+          </a:xfrm>
+          <a:prstGeom prst="rect">
+            <a:avLst/>
+          </a:prstGeom>
+          <a:noFill/>
+        </p:spPr>
+        <p:txBody>
+          <a:bodyPr wrap="none" rtlCol="0">
+            <a:spAutoFit/>
+          </a:bodyPr>
+          <a:lstStyle/>
+          <a:p>
+            <a:pPr marL="285750" indent="-285750">
+              <a:buFont typeface="Wingdings" pitchFamily="2" charset="2"/>
+              <a:buChar char="§"/>
+            </a:pPr>
+            <a:r>
+              <a:rPr lang="en-US" b="1" i="1" dirty="0"/>
+              <a:t>Flop count</a:t>
+            </a:r>
+            <a:r>
+              <a:rPr lang="en-US" i="1" dirty="0"/>
+              <a:t> </a:t>
+            </a:r>
+            <a:r>
+              <a:rPr lang="en-US" dirty="0"/>
+              <a:t>and </a:t>
+            </a:r>
+            <a:r>
+              <a:rPr lang="en-US" b="1" i="1" dirty="0"/>
+              <a:t>memory accesses</a:t>
+            </a:r>
+          </a:p>
+        </p:txBody>
+      </p:sp>
+      <p:pic>
+        <p:nvPicPr>
+          <p:cNvPr id="7" name="Picture 6">
+            <a:extLst>
+              <a:ext uri="{FF2B5EF4-FFF2-40B4-BE49-F238E27FC236}">
+                <a16:creationId xmlns:a16="http://schemas.microsoft.com/office/drawing/2014/main" id="{5B8A5B45-47DC-EC47-B2C1-9DBCCF3FB1B2}"/>
+              </a:ext>
+            </a:extLst>
+          </p:cNvPr>
+          <p:cNvPicPr>
+            <a:picLocks noChangeAspect="1"/>
+          </p:cNvPicPr>
+          <p:nvPr/>
+        </p:nvPicPr>
+        <p:blipFill>
+          <a:blip r:embed="rId3"/>
+          <a:stretch>
+            <a:fillRect/>
+          </a:stretch>
+        </p:blipFill>
+        <p:spPr>
+          <a:xfrm>
+            <a:off x="0" y="2432036"/>
+            <a:ext cx="12187238" cy="2463919"/>
+          </a:xfrm>
+          <a:prstGeom prst="rect">
+            <a:avLst/>
+          </a:prstGeom>
+        </p:spPr>
+      </p:pic>
+      <p:sp>
+        <p:nvSpPr>
+          <p:cNvPr id="8" name="TextBox 7">
+            <a:extLst>
+              <a:ext uri="{FF2B5EF4-FFF2-40B4-BE49-F238E27FC236}">
+                <a16:creationId xmlns:a16="http://schemas.microsoft.com/office/drawing/2014/main" id="{D5A17539-0F6F-8C4E-B381-5B58575C89A5}"/>
+              </a:ext>
+            </a:extLst>
+          </p:cNvPr>
+          <p:cNvSpPr txBox="1"/>
+          <p:nvPr/>
+        </p:nvSpPr>
+        <p:spPr>
+          <a:xfrm>
+            <a:off x="323849" y="5469124"/>
+            <a:ext cx="9975808" cy="369332"/>
+          </a:xfrm>
+          <a:prstGeom prst="rect">
+            <a:avLst/>
+          </a:prstGeom>
+          <a:noFill/>
+        </p:spPr>
+        <p:txBody>
+          <a:bodyPr wrap="none" rtlCol="0">
+            <a:spAutoFit/>
+          </a:bodyPr>
+          <a:lstStyle/>
+          <a:p>
+            <a:pPr marL="285750" indent="-285750">
+              <a:buFont typeface="Wingdings" pitchFamily="2" charset="2"/>
+              <a:buChar char="§"/>
+            </a:pPr>
+            <a:r>
+              <a:rPr lang="en-US" b="1" i="1" dirty="0"/>
+              <a:t>Bottlenecks:</a:t>
+            </a:r>
+            <a:r>
+              <a:rPr lang="en-US" i="1" dirty="0"/>
+              <a:t> </a:t>
+            </a:r>
+            <a:r>
+              <a:rPr lang="en-US" dirty="0" err="1"/>
+              <a:t>row_filter_transpose</a:t>
+            </a:r>
+            <a:r>
+              <a:rPr lang="en-US" dirty="0"/>
+              <a:t>, </a:t>
+            </a:r>
+            <a:r>
+              <a:rPr lang="en-US" dirty="0" err="1"/>
+              <a:t>ethsift_apply_kernel</a:t>
+            </a:r>
+            <a:r>
+              <a:rPr lang="en-US" dirty="0"/>
+              <a:t>, </a:t>
+            </a:r>
+            <a:r>
+              <a:rPr lang="en-US" dirty="0" err="1"/>
+              <a:t>ethsift_generate_gaussian_pyramid</a:t>
+            </a:r>
+            <a:r>
+              <a:rPr lang="en-US" dirty="0"/>
+              <a:t> </a:t>
+            </a:r>
+            <a:endParaRPr lang="en-US" b="1" dirty="0"/>
           </a:p>
         </p:txBody>
       </p:sp>
@@ -44940,7 +45088,61 @@
           <a:bodyPr/>
           <a:lstStyle/>
           <a:p>
-            <a:endParaRPr lang="en-US"/>
+            <a:r>
+              <a:rPr lang="en-US" sz="3200" dirty="0">
+                <a:latin typeface="Calibri" panose="020F0502020204030204" pitchFamily="34" charset="0"/>
+                <a:cs typeface="Calibri" panose="020F0502020204030204" pitchFamily="34" charset="0"/>
+              </a:rPr>
+              <a:t>Baseline Implementation</a:t>
+            </a:r>
+          </a:p>
+        </p:txBody>
+      </p:sp>
+      <p:sp>
+        <p:nvSpPr>
+          <p:cNvPr id="6" name="TextBox 5">
+            <a:extLst>
+              <a:ext uri="{FF2B5EF4-FFF2-40B4-BE49-F238E27FC236}">
+                <a16:creationId xmlns:a16="http://schemas.microsoft.com/office/drawing/2014/main" id="{16F5FF34-BFE2-D048-BBCA-E5FFA63F0B42}"/>
+              </a:ext>
+            </a:extLst>
+          </p:cNvPr>
+          <p:cNvSpPr txBox="1"/>
+          <p:nvPr/>
+        </p:nvSpPr>
+        <p:spPr>
+          <a:xfrm>
+            <a:off x="323850" y="1408048"/>
+            <a:ext cx="3038011" cy="369332"/>
+          </a:xfrm>
+          <a:prstGeom prst="rect">
+            <a:avLst/>
+          </a:prstGeom>
+          <a:noFill/>
+        </p:spPr>
+        <p:txBody>
+          <a:bodyPr wrap="none" rtlCol="0">
+            <a:spAutoFit/>
+          </a:bodyPr>
+          <a:lstStyle/>
+          <a:p>
+            <a:pPr marL="285750" indent="-285750">
+              <a:buFont typeface="Wingdings" pitchFamily="2" charset="2"/>
+              <a:buChar char="§"/>
+            </a:pPr>
+            <a:r>
+              <a:rPr lang="en-US" b="1" i="1" dirty="0" err="1"/>
+              <a:t>ezSIFT</a:t>
+            </a:r>
+            <a:r>
+              <a:rPr lang="en-US" b="1" i="1" dirty="0"/>
+              <a:t> </a:t>
+            </a:r>
+            <a:r>
+              <a:rPr lang="en-US" dirty="0"/>
+              <a:t>as benchmarking</a:t>
+            </a:r>
+            <a:endParaRPr lang="en-US" b="1" i="1" dirty="0"/>
           </a:p>
         </p:txBody>
       </p:sp>
@@ -45085,7 +45287,24 @@
           <a:bodyPr/>
           <a:lstStyle/>
           <a:p>
-            <a:endParaRPr lang="en-US"/>
+            <a:r>
+              <a:rPr lang="en-US" sz="3200" dirty="0">
+                <a:latin typeface="Calibri" panose="020F0502020204030204" pitchFamily="34" charset="0"/>
+                <a:cs typeface="Calibri" panose="020F0502020204030204" pitchFamily="34" charset="0"/>
+              </a:rPr>
+              <a:t>Standard C </a:t>
+            </a:r>
+            <a:r>
+              <a:rPr lang="en-US" sz="3200" dirty="0" err="1">
+                <a:latin typeface="Calibri" panose="020F0502020204030204" pitchFamily="34" charset="0"/>
+                <a:cs typeface="Calibri" panose="020F0502020204030204" pitchFamily="34" charset="0"/>
+              </a:rPr>
+              <a:t>optimisations</a:t>
+            </a:r>
+            <a:endParaRPr lang="en-US" sz="3200" dirty="0">
+              <a:latin typeface="Calibri" panose="020F0502020204030204" pitchFamily="34" charset="0"/>
+              <a:cs typeface="Calibri" panose="020F0502020204030204" pitchFamily="34" charset="0"/>
+            </a:endParaRPr>
           </a:p>
         </p:txBody>
       </p:sp>
@@ -45230,7 +45449,24 @@
           <a:bodyPr/>
           <a:lstStyle/>
           <a:p>
-            <a:endParaRPr lang="en-US"/>
+            <a:r>
+              <a:rPr lang="en-US" sz="3200" dirty="0">
+                <a:latin typeface="Calibri" panose="020F0502020204030204" pitchFamily="34" charset="0"/>
+                <a:cs typeface="Calibri" panose="020F0502020204030204" pitchFamily="34" charset="0"/>
+              </a:rPr>
+              <a:t>AVX </a:t>
+            </a:r>
+            <a:r>
+              <a:rPr lang="en-US" sz="3200" dirty="0" err="1">
+                <a:latin typeface="Calibri" panose="020F0502020204030204" pitchFamily="34" charset="0"/>
+                <a:cs typeface="Calibri" panose="020F0502020204030204" pitchFamily="34" charset="0"/>
+              </a:rPr>
+              <a:t>optimisations</a:t>
+            </a:r>
+            <a:endParaRPr lang="en-US" sz="3200" dirty="0">
+              <a:latin typeface="Calibri" panose="020F0502020204030204" pitchFamily="34" charset="0"/>
+              <a:cs typeface="Calibri" panose="020F0502020204030204" pitchFamily="34" charset="0"/>
+            </a:endParaRPr>
           </a:p>
         </p:txBody>
       </p:sp>
@@ -45375,7 +45611,116 @@
           <a:bodyPr/>
           <a:lstStyle/>
           <a:p>
-            <a:endParaRPr lang="en-US"/>
+            <a:r>
+              <a:rPr lang="en-US" sz="3200" dirty="0">
+                <a:latin typeface="Calibri" panose="020F0502020204030204" pitchFamily="34" charset="0"/>
+                <a:cs typeface="Calibri" panose="020F0502020204030204" pitchFamily="34" charset="0"/>
+              </a:rPr>
+              <a:t>Experimental Results </a:t>
+            </a:r>
+            <a:r>
+              <a:rPr lang="en-US" sz="2400" dirty="0">
+                <a:latin typeface="Calibri" panose="020F0502020204030204" pitchFamily="34" charset="0"/>
+                <a:cs typeface="Calibri" panose="020F0502020204030204" pitchFamily="34" charset="0"/>
+              </a:rPr>
+              <a:t>(Intel i7-7820HQ @ 2.9GHz)</a:t>
+            </a:r>
+          </a:p>
+        </p:txBody>
+      </p:sp>
+      <p:pic>
+        <p:nvPicPr>
+          <p:cNvPr id="7" name="Picture 6" descr="A screenshot of a social media post&#10;&#10;Description automatically generated">
+            <a:extLst>
+              <a:ext uri="{FF2B5EF4-FFF2-40B4-BE49-F238E27FC236}">
+                <a16:creationId xmlns:a16="http://schemas.microsoft.com/office/drawing/2014/main" id="{250D4B7F-EEA1-3C4A-97BC-A29FCE0D046D}"/>
+              </a:ext>
+            </a:extLst>
+          </p:cNvPr>
+          <p:cNvPicPr>
+            <a:picLocks noChangeAspect="1"/>
+          </p:cNvPicPr>
+          <p:nvPr/>
+        </p:nvPicPr>
+        <p:blipFill>
+          <a:blip r:embed="rId3">
+            <a:extLst>
+              <a:ext uri="{28A0092B-C50C-407E-A947-70E740481C1C}">
+                <a14:useLocalDpi xmlns:a14="http://schemas.microsoft.com/office/drawing/2010/main" val="0"/>
+              </a:ext>
+            </a:extLst>
+          </a:blip>
+          <a:stretch>
+            <a:fillRect/>
+          </a:stretch>
+        </p:blipFill>
+        <p:spPr>
+          <a:xfrm>
+            <a:off x="0" y="1429879"/>
+            <a:ext cx="12187238" cy="5484257"/>
+          </a:xfrm>
+          <a:prstGeom prst="rect">
+            <a:avLst/>
+          </a:prstGeom>
+        </p:spPr>
+      </p:pic>
+      <p:sp>
+        <p:nvSpPr>
+          <p:cNvPr id="8" name="TextBox 7">
+            <a:extLst>
+              <a:ext uri="{FF2B5EF4-FFF2-40B4-BE49-F238E27FC236}">
+                <a16:creationId xmlns:a16="http://schemas.microsoft.com/office/drawing/2014/main" id="{7C188C6D-6BAD-1E41-91A1-AF9102D571CA}"/>
+              </a:ext>
+            </a:extLst>
+          </p:cNvPr>
+          <p:cNvSpPr txBox="1"/>
+          <p:nvPr/>
+        </p:nvSpPr>
+        <p:spPr>
+          <a:xfrm>
+            <a:off x="9263270" y="783548"/>
+            <a:ext cx="2598530" cy="646331"/>
+          </a:xfrm>
+          <a:prstGeom prst="rect">
+            <a:avLst/>
+          </a:prstGeom>
+          <a:noFill/>
+        </p:spPr>
+        <p:txBody>
+          <a:bodyPr wrap="square" rtlCol="0">
+            <a:spAutoFit/>
+          </a:bodyPr>
+          <a:lstStyle/>
+          <a:p>
+            <a:pPr algn="ctr"/>
+            <a:r>
+              <a:rPr lang="en-US" dirty="0">
+                <a:latin typeface="Calibri" panose="020F0502020204030204" pitchFamily="34" charset="0"/>
+                <a:cs typeface="Calibri" panose="020F0502020204030204" pitchFamily="34" charset="0"/>
+              </a:rPr>
+              <a:t>Overall Speedup: </a:t>
+            </a:r>
+          </a:p>
+          <a:p>
+            <a:pPr algn="ctr"/>
+            <a:r>
+              <a:rPr lang="en-US" dirty="0">
+                <a:latin typeface="Calibri" panose="020F0502020204030204" pitchFamily="34" charset="0"/>
+                <a:cs typeface="Calibri" panose="020F0502020204030204" pitchFamily="34" charset="0"/>
+              </a:rPr>
+              <a:t>x </a:t>
+            </a:r>
+            <a:r>
+              <a:rPr lang="en-US" dirty="0" err="1">
+                <a:latin typeface="Calibri" panose="020F0502020204030204" pitchFamily="34" charset="0"/>
+                <a:cs typeface="Calibri" panose="020F0502020204030204" pitchFamily="34" charset="0"/>
+              </a:rPr>
+              <a:t>x.xx</a:t>
+            </a:r>
+            <a:endParaRPr lang="en-US" dirty="0">
+              <a:latin typeface="Calibri" panose="020F0502020204030204" pitchFamily="34" charset="0"/>
+              <a:cs typeface="Calibri" panose="020F0502020204030204" pitchFamily="34" charset="0"/>
+            </a:endParaRPr>
           </a:p>
         </p:txBody>
       </p:sp>
@@ -45528,151 +45873,6 @@
     <p:extLst>
       <p:ext uri="{BB962C8B-B14F-4D97-AF65-F5344CB8AC3E}">
         <p14:creationId xmlns:p14="http://schemas.microsoft.com/office/powerpoint/2010/main" val="1791853520"/>
-      </p:ext>
-    </p:extLst>
-  </p:cSld>
-  <p:clrMapOvr>
-    <a:masterClrMapping/>
-  </p:clrMapOvr>
-  <p:transition>
-    <p:fade/>
-  </p:transition>
-</p:sld>
-</file>
-
-<file path=ppt/slides/slide9.xml><?xml version="1.0" encoding="utf-8"?>
-<p:sld xmlns:a="http://schemas.openxmlformats.org/drawingml/2006/main" xmlns:r="http://schemas.openxmlformats.org/officeDocument/2006/relationships" xmlns:p="http://schemas.openxmlformats.org/presentationml/2006/main">
-  <p:cSld>
-    <p:spTree>
-      <p:nvGrpSpPr>
-        <p:cNvPr id="1" name=""/>
-        <p:cNvGrpSpPr/>
-        <p:nvPr/>
-      </p:nvGrpSpPr>
-      <p:grpSpPr>
-        <a:xfrm>
-          <a:off x="0" y="0"/>
-          <a:ext cx="0" cy="0"/>
-          <a:chOff x="0" y="0"/>
-          <a:chExt cx="0" cy="0"/>
-        </a:xfrm>
-      </p:grpSpPr>
-      <p:sp>
-        <p:nvSpPr>
-          <p:cNvPr id="2" name="Date Placeholder 1">
-            <a:extLst>
-              <a:ext uri="{FF2B5EF4-FFF2-40B4-BE49-F238E27FC236}">
-                <a16:creationId xmlns:a16="http://schemas.microsoft.com/office/drawing/2014/main" id="{3965F608-D5FD-414A-8DD8-132A44AF5E15}"/>
-              </a:ext>
-            </a:extLst>
-          </p:cNvPr>
-          <p:cNvSpPr>
-            <a:spLocks noGrp="1"/>
-          </p:cNvSpPr>
-          <p:nvPr>
-            <p:ph type="dt" sz="half" idx="10"/>
-          </p:nvPr>
-        </p:nvSpPr>
-        <p:spPr/>
-        <p:txBody>
-          <a:bodyPr/>
-          <a:lstStyle/>
-          <a:p>
-            <a:fld id="{5DAAA6BA-0F4E-49B5-BB9C-DAC12EFCD836}" type="datetime1">
-              <a:rPr lang="de-DE" smtClean="0"/>
-              <a:t>21.05.20</a:t>
-            </a:fld>
-            <a:endParaRPr lang="en-GB" dirty="0"/>
-          </a:p>
-        </p:txBody>
-      </p:sp>
-      <p:sp>
-        <p:nvSpPr>
-          <p:cNvPr id="3" name="Footer Placeholder 2">
-            <a:extLst>
-              <a:ext uri="{FF2B5EF4-FFF2-40B4-BE49-F238E27FC236}">
-                <a16:creationId xmlns:a16="http://schemas.microsoft.com/office/drawing/2014/main" id="{3B9BAAAE-37EF-1142-8993-D2A0908857C5}"/>
-              </a:ext>
-            </a:extLst>
-          </p:cNvPr>
-          <p:cNvSpPr>
-            <a:spLocks noGrp="1"/>
-          </p:cNvSpPr>
-          <p:nvPr>
-            <p:ph type="ftr" sz="quarter" idx="11"/>
-          </p:nvPr>
-        </p:nvSpPr>
-        <p:spPr/>
-        <p:txBody>
-          <a:bodyPr/>
-          <a:lstStyle/>
-          <a:p>
-            <a:r>
-              <a:rPr lang="en-GB"/>
-              <a:t>Team 007</a:t>
-            </a:r>
-            <a:endParaRPr lang="en-GB" dirty="0"/>
-          </a:p>
-        </p:txBody>
-      </p:sp>
-      <p:sp>
-        <p:nvSpPr>
-          <p:cNvPr id="4" name="Slide Number Placeholder 3">
-            <a:extLst>
-              <a:ext uri="{FF2B5EF4-FFF2-40B4-BE49-F238E27FC236}">
-                <a16:creationId xmlns:a16="http://schemas.microsoft.com/office/drawing/2014/main" id="{D9F9F050-D6B8-A64A-9D80-FA43ACAD675F}"/>
-              </a:ext>
-            </a:extLst>
-          </p:cNvPr>
-          <p:cNvSpPr>
-            <a:spLocks noGrp="1"/>
-          </p:cNvSpPr>
-          <p:nvPr>
-            <p:ph type="sldNum" sz="quarter" idx="12"/>
-          </p:nvPr>
-        </p:nvSpPr>
-        <p:spPr/>
-        <p:txBody>
-          <a:bodyPr/>
-          <a:lstStyle/>
-          <a:p>
-            <a:fld id="{6C6AE60A-B69C-4790-82F7-3882EDF23186}" type="slidenum">
-              <a:rPr lang="en-GB" smtClean="0"/>
-              <a:t>9</a:t>
-            </a:fld>
-            <a:endParaRPr lang="en-GB" dirty="0"/>
-          </a:p>
-        </p:txBody>
-      </p:sp>
-      <p:sp>
-        <p:nvSpPr>
-          <p:cNvPr id="5" name="Title 4">
-            <a:extLst>
-              <a:ext uri="{FF2B5EF4-FFF2-40B4-BE49-F238E27FC236}">
-                <a16:creationId xmlns:a16="http://schemas.microsoft.com/office/drawing/2014/main" id="{DFAE12E2-E1F3-AA4E-B012-6E887590CE46}"/>
-              </a:ext>
-            </a:extLst>
-          </p:cNvPr>
-          <p:cNvSpPr>
-            <a:spLocks noGrp="1"/>
-          </p:cNvSpPr>
-          <p:nvPr>
-            <p:ph type="title"/>
-          </p:nvPr>
-        </p:nvSpPr>
-        <p:spPr/>
-        <p:txBody>
-          <a:bodyPr/>
-          <a:lstStyle/>
-          <a:p>
-            <a:endParaRPr lang="en-US"/>
-          </a:p>
-        </p:txBody>
-      </p:sp>
-    </p:spTree>
-    <p:extLst>
-      <p:ext uri="{BB962C8B-B14F-4D97-AF65-F5344CB8AC3E}">
-        <p14:creationId xmlns:p14="http://schemas.microsoft.com/office/powerpoint/2010/main" val="2340955008"/>
       </p:ext>
     </p:extLst>
   </p:cSld>

</xml_diff>

<commit_message>
add additional observation slide
</commit_message>
<xml_diff>
--- a/presentation/07.pptx
+++ b/presentation/07.pptx
@@ -19,10 +19,10 @@
     <p:sldId id="256" r:id="rId10"/>
     <p:sldId id="263" r:id="rId11"/>
     <p:sldId id="264" r:id="rId12"/>
-    <p:sldId id="265" r:id="rId13"/>
-    <p:sldId id="266" r:id="rId14"/>
-    <p:sldId id="267" r:id="rId15"/>
-    <p:sldId id="268" r:id="rId16"/>
+    <p:sldId id="268" r:id="rId13"/>
+    <p:sldId id="265" r:id="rId14"/>
+    <p:sldId id="266" r:id="rId15"/>
+    <p:sldId id="267" r:id="rId16"/>
     <p:sldId id="269" r:id="rId17"/>
   </p:sldIdLst>
   <p:sldSz cx="12187238" cy="6858000"/>
@@ -1659,7 +1659,7 @@
           <a:p>
             <a:fld id="{BD41A84A-8E87-4426-9AFA-011B1ECC53C8}" type="slidenum">
               <a:rPr lang="de-CH" smtClean="0"/>
-              <a:t>7</a:t>
+              <a:t>4</a:t>
             </a:fld>
             <a:endParaRPr lang="de-CH"/>
           </a:p>
@@ -44985,529 +44985,6 @@
           <p:cNvPr id="2" name="Date Placeholder 1">
             <a:extLst>
               <a:ext uri="{FF2B5EF4-FFF2-40B4-BE49-F238E27FC236}">
-                <a16:creationId xmlns:a16="http://schemas.microsoft.com/office/drawing/2014/main" id="{4A7A086E-2E7A-664F-93EC-3FC61809C00D}"/>
-              </a:ext>
-            </a:extLst>
-          </p:cNvPr>
-          <p:cNvSpPr>
-            <a:spLocks noGrp="1"/>
-          </p:cNvSpPr>
-          <p:nvPr>
-            <p:ph type="dt" sz="half" idx="10"/>
-          </p:nvPr>
-        </p:nvSpPr>
-        <p:spPr/>
-        <p:txBody>
-          <a:bodyPr/>
-          <a:lstStyle/>
-          <a:p>
-            <a:fld id="{5DAAA6BA-0F4E-49B5-BB9C-DAC12EFCD836}" type="datetime1">
-              <a:rPr lang="de-DE" smtClean="0"/>
-              <a:t>21.05.20</a:t>
-            </a:fld>
-            <a:endParaRPr lang="en-GB" dirty="0"/>
-          </a:p>
-        </p:txBody>
-      </p:sp>
-      <p:sp>
-        <p:nvSpPr>
-          <p:cNvPr id="3" name="Footer Placeholder 2">
-            <a:extLst>
-              <a:ext uri="{FF2B5EF4-FFF2-40B4-BE49-F238E27FC236}">
-                <a16:creationId xmlns:a16="http://schemas.microsoft.com/office/drawing/2014/main" id="{9CD839C2-6D65-9940-833A-7EA02B940E55}"/>
-              </a:ext>
-            </a:extLst>
-          </p:cNvPr>
-          <p:cNvSpPr>
-            <a:spLocks noGrp="1"/>
-          </p:cNvSpPr>
-          <p:nvPr>
-            <p:ph type="ftr" sz="quarter" idx="11"/>
-          </p:nvPr>
-        </p:nvSpPr>
-        <p:spPr/>
-        <p:txBody>
-          <a:bodyPr/>
-          <a:lstStyle/>
-          <a:p>
-            <a:r>
-              <a:rPr lang="en-GB"/>
-              <a:t>Team 007</a:t>
-            </a:r>
-            <a:endParaRPr lang="en-GB" dirty="0"/>
-          </a:p>
-        </p:txBody>
-      </p:sp>
-      <p:sp>
-        <p:nvSpPr>
-          <p:cNvPr id="4" name="Slide Number Placeholder 3">
-            <a:extLst>
-              <a:ext uri="{FF2B5EF4-FFF2-40B4-BE49-F238E27FC236}">
-                <a16:creationId xmlns:a16="http://schemas.microsoft.com/office/drawing/2014/main" id="{9ABDEC74-F614-A14D-BA57-A4D56BF20DB8}"/>
-              </a:ext>
-            </a:extLst>
-          </p:cNvPr>
-          <p:cNvSpPr>
-            <a:spLocks noGrp="1"/>
-          </p:cNvSpPr>
-          <p:nvPr>
-            <p:ph type="sldNum" sz="quarter" idx="12"/>
-          </p:nvPr>
-        </p:nvSpPr>
-        <p:spPr/>
-        <p:txBody>
-          <a:bodyPr/>
-          <a:lstStyle/>
-          <a:p>
-            <a:fld id="{6C6AE60A-B69C-4790-82F7-3882EDF23186}" type="slidenum">
-              <a:rPr lang="en-GB" smtClean="0"/>
-              <a:t>4</a:t>
-            </a:fld>
-            <a:endParaRPr lang="en-GB" dirty="0"/>
-          </a:p>
-        </p:txBody>
-      </p:sp>
-      <p:sp>
-        <p:nvSpPr>
-          <p:cNvPr id="5" name="Title 4">
-            <a:extLst>
-              <a:ext uri="{FF2B5EF4-FFF2-40B4-BE49-F238E27FC236}">
-                <a16:creationId xmlns:a16="http://schemas.microsoft.com/office/drawing/2014/main" id="{D56DDB95-37F1-0B47-91FF-7C0BFAA2C48A}"/>
-              </a:ext>
-            </a:extLst>
-          </p:cNvPr>
-          <p:cNvSpPr>
-            <a:spLocks noGrp="1"/>
-          </p:cNvSpPr>
-          <p:nvPr>
-            <p:ph type="title"/>
-          </p:nvPr>
-        </p:nvSpPr>
-        <p:spPr/>
-        <p:txBody>
-          <a:bodyPr/>
-          <a:lstStyle/>
-          <a:p>
-            <a:r>
-              <a:rPr lang="en-US" sz="3200" dirty="0">
-                <a:latin typeface="Calibri" panose="020F0502020204030204" pitchFamily="34" charset="0"/>
-                <a:cs typeface="Calibri" panose="020F0502020204030204" pitchFamily="34" charset="0"/>
-              </a:rPr>
-              <a:t>Baseline Implementation</a:t>
-            </a:r>
-          </a:p>
-        </p:txBody>
-      </p:sp>
-      <p:sp>
-        <p:nvSpPr>
-          <p:cNvPr id="6" name="TextBox 5">
-            <a:extLst>
-              <a:ext uri="{FF2B5EF4-FFF2-40B4-BE49-F238E27FC236}">
-                <a16:creationId xmlns:a16="http://schemas.microsoft.com/office/drawing/2014/main" id="{16F5FF34-BFE2-D048-BBCA-E5FFA63F0B42}"/>
-              </a:ext>
-            </a:extLst>
-          </p:cNvPr>
-          <p:cNvSpPr txBox="1"/>
-          <p:nvPr/>
-        </p:nvSpPr>
-        <p:spPr>
-          <a:xfrm>
-            <a:off x="323850" y="1408048"/>
-            <a:ext cx="3038011" cy="369332"/>
-          </a:xfrm>
-          <a:prstGeom prst="rect">
-            <a:avLst/>
-          </a:prstGeom>
-          <a:noFill/>
-        </p:spPr>
-        <p:txBody>
-          <a:bodyPr wrap="none" rtlCol="0">
-            <a:spAutoFit/>
-          </a:bodyPr>
-          <a:lstStyle/>
-          <a:p>
-            <a:pPr marL="285750" indent="-285750">
-              <a:buFont typeface="Wingdings" pitchFamily="2" charset="2"/>
-              <a:buChar char="§"/>
-            </a:pPr>
-            <a:r>
-              <a:rPr lang="en-US" b="1" i="1" dirty="0" err="1"/>
-              <a:t>ezSIFT</a:t>
-            </a:r>
-            <a:r>
-              <a:rPr lang="en-US" b="1" i="1" dirty="0"/>
-              <a:t> </a:t>
-            </a:r>
-            <a:r>
-              <a:rPr lang="en-US" dirty="0"/>
-              <a:t>as benchmarking</a:t>
-            </a:r>
-            <a:endParaRPr lang="en-US" b="1" i="1" dirty="0"/>
-          </a:p>
-        </p:txBody>
-      </p:sp>
-    </p:spTree>
-    <p:extLst>
-      <p:ext uri="{BB962C8B-B14F-4D97-AF65-F5344CB8AC3E}">
-        <p14:creationId xmlns:p14="http://schemas.microsoft.com/office/powerpoint/2010/main" val="1234454889"/>
-      </p:ext>
-    </p:extLst>
-  </p:cSld>
-  <p:clrMapOvr>
-    <a:masterClrMapping/>
-  </p:clrMapOvr>
-  <p:transition>
-    <p:fade/>
-  </p:transition>
-</p:sld>
-</file>
-
-<file path=ppt/slides/slide5.xml><?xml version="1.0" encoding="utf-8"?>
-<p:sld xmlns:a="http://schemas.openxmlformats.org/drawingml/2006/main" xmlns:r="http://schemas.openxmlformats.org/officeDocument/2006/relationships" xmlns:p="http://schemas.openxmlformats.org/presentationml/2006/main">
-  <p:cSld>
-    <p:spTree>
-      <p:nvGrpSpPr>
-        <p:cNvPr id="1" name=""/>
-        <p:cNvGrpSpPr/>
-        <p:nvPr/>
-      </p:nvGrpSpPr>
-      <p:grpSpPr>
-        <a:xfrm>
-          <a:off x="0" y="0"/>
-          <a:ext cx="0" cy="0"/>
-          <a:chOff x="0" y="0"/>
-          <a:chExt cx="0" cy="0"/>
-        </a:xfrm>
-      </p:grpSpPr>
-      <p:sp>
-        <p:nvSpPr>
-          <p:cNvPr id="2" name="Date Placeholder 1">
-            <a:extLst>
-              <a:ext uri="{FF2B5EF4-FFF2-40B4-BE49-F238E27FC236}">
-                <a16:creationId xmlns:a16="http://schemas.microsoft.com/office/drawing/2014/main" id="{C03172AE-DF41-7249-955A-3C32CA18F196}"/>
-              </a:ext>
-            </a:extLst>
-          </p:cNvPr>
-          <p:cNvSpPr>
-            <a:spLocks noGrp="1"/>
-          </p:cNvSpPr>
-          <p:nvPr>
-            <p:ph type="dt" sz="half" idx="10"/>
-          </p:nvPr>
-        </p:nvSpPr>
-        <p:spPr/>
-        <p:txBody>
-          <a:bodyPr/>
-          <a:lstStyle/>
-          <a:p>
-            <a:fld id="{5DAAA6BA-0F4E-49B5-BB9C-DAC12EFCD836}" type="datetime1">
-              <a:rPr lang="de-DE" smtClean="0"/>
-              <a:t>21.05.20</a:t>
-            </a:fld>
-            <a:endParaRPr lang="en-GB" dirty="0"/>
-          </a:p>
-        </p:txBody>
-      </p:sp>
-      <p:sp>
-        <p:nvSpPr>
-          <p:cNvPr id="3" name="Footer Placeholder 2">
-            <a:extLst>
-              <a:ext uri="{FF2B5EF4-FFF2-40B4-BE49-F238E27FC236}">
-                <a16:creationId xmlns:a16="http://schemas.microsoft.com/office/drawing/2014/main" id="{DF91D8B5-5156-EC42-844E-87EE108A2AFA}"/>
-              </a:ext>
-            </a:extLst>
-          </p:cNvPr>
-          <p:cNvSpPr>
-            <a:spLocks noGrp="1"/>
-          </p:cNvSpPr>
-          <p:nvPr>
-            <p:ph type="ftr" sz="quarter" idx="11"/>
-          </p:nvPr>
-        </p:nvSpPr>
-        <p:spPr/>
-        <p:txBody>
-          <a:bodyPr/>
-          <a:lstStyle/>
-          <a:p>
-            <a:r>
-              <a:rPr lang="en-GB"/>
-              <a:t>Team 007</a:t>
-            </a:r>
-            <a:endParaRPr lang="en-GB" dirty="0"/>
-          </a:p>
-        </p:txBody>
-      </p:sp>
-      <p:sp>
-        <p:nvSpPr>
-          <p:cNvPr id="4" name="Slide Number Placeholder 3">
-            <a:extLst>
-              <a:ext uri="{FF2B5EF4-FFF2-40B4-BE49-F238E27FC236}">
-                <a16:creationId xmlns:a16="http://schemas.microsoft.com/office/drawing/2014/main" id="{1227E194-A41B-BE49-9FEF-8C192C660303}"/>
-              </a:ext>
-            </a:extLst>
-          </p:cNvPr>
-          <p:cNvSpPr>
-            <a:spLocks noGrp="1"/>
-          </p:cNvSpPr>
-          <p:nvPr>
-            <p:ph type="sldNum" sz="quarter" idx="12"/>
-          </p:nvPr>
-        </p:nvSpPr>
-        <p:spPr/>
-        <p:txBody>
-          <a:bodyPr/>
-          <a:lstStyle/>
-          <a:p>
-            <a:fld id="{6C6AE60A-B69C-4790-82F7-3882EDF23186}" type="slidenum">
-              <a:rPr lang="en-GB" smtClean="0"/>
-              <a:t>5</a:t>
-            </a:fld>
-            <a:endParaRPr lang="en-GB" dirty="0"/>
-          </a:p>
-        </p:txBody>
-      </p:sp>
-      <p:sp>
-        <p:nvSpPr>
-          <p:cNvPr id="5" name="Title 4">
-            <a:extLst>
-              <a:ext uri="{FF2B5EF4-FFF2-40B4-BE49-F238E27FC236}">
-                <a16:creationId xmlns:a16="http://schemas.microsoft.com/office/drawing/2014/main" id="{D67EBCE5-916E-E745-8C8F-75C0176456DB}"/>
-              </a:ext>
-            </a:extLst>
-          </p:cNvPr>
-          <p:cNvSpPr>
-            <a:spLocks noGrp="1"/>
-          </p:cNvSpPr>
-          <p:nvPr>
-            <p:ph type="title"/>
-          </p:nvPr>
-        </p:nvSpPr>
-        <p:spPr/>
-        <p:txBody>
-          <a:bodyPr/>
-          <a:lstStyle/>
-          <a:p>
-            <a:r>
-              <a:rPr lang="en-US" sz="3200" dirty="0">
-                <a:latin typeface="Calibri" panose="020F0502020204030204" pitchFamily="34" charset="0"/>
-                <a:cs typeface="Calibri" panose="020F0502020204030204" pitchFamily="34" charset="0"/>
-              </a:rPr>
-              <a:t>Standard C </a:t>
-            </a:r>
-            <a:r>
-              <a:rPr lang="en-US" sz="3200" dirty="0" err="1">
-                <a:latin typeface="Calibri" panose="020F0502020204030204" pitchFamily="34" charset="0"/>
-                <a:cs typeface="Calibri" panose="020F0502020204030204" pitchFamily="34" charset="0"/>
-              </a:rPr>
-              <a:t>optimisations</a:t>
-            </a:r>
-            <a:endParaRPr lang="en-US" sz="3200" dirty="0">
-              <a:latin typeface="Calibri" panose="020F0502020204030204" pitchFamily="34" charset="0"/>
-              <a:cs typeface="Calibri" panose="020F0502020204030204" pitchFamily="34" charset="0"/>
-            </a:endParaRPr>
-          </a:p>
-        </p:txBody>
-      </p:sp>
-    </p:spTree>
-    <p:extLst>
-      <p:ext uri="{BB962C8B-B14F-4D97-AF65-F5344CB8AC3E}">
-        <p14:creationId xmlns:p14="http://schemas.microsoft.com/office/powerpoint/2010/main" val="1999106558"/>
-      </p:ext>
-    </p:extLst>
-  </p:cSld>
-  <p:clrMapOvr>
-    <a:masterClrMapping/>
-  </p:clrMapOvr>
-  <p:transition>
-    <p:fade/>
-  </p:transition>
-</p:sld>
-</file>
-
-<file path=ppt/slides/slide6.xml><?xml version="1.0" encoding="utf-8"?>
-<p:sld xmlns:a="http://schemas.openxmlformats.org/drawingml/2006/main" xmlns:r="http://schemas.openxmlformats.org/officeDocument/2006/relationships" xmlns:p="http://schemas.openxmlformats.org/presentationml/2006/main">
-  <p:cSld>
-    <p:spTree>
-      <p:nvGrpSpPr>
-        <p:cNvPr id="1" name=""/>
-        <p:cNvGrpSpPr/>
-        <p:nvPr/>
-      </p:nvGrpSpPr>
-      <p:grpSpPr>
-        <a:xfrm>
-          <a:off x="0" y="0"/>
-          <a:ext cx="0" cy="0"/>
-          <a:chOff x="0" y="0"/>
-          <a:chExt cx="0" cy="0"/>
-        </a:xfrm>
-      </p:grpSpPr>
-      <p:sp>
-        <p:nvSpPr>
-          <p:cNvPr id="2" name="Date Placeholder 1">
-            <a:extLst>
-              <a:ext uri="{FF2B5EF4-FFF2-40B4-BE49-F238E27FC236}">
-                <a16:creationId xmlns:a16="http://schemas.microsoft.com/office/drawing/2014/main" id="{0CAB53FB-6BD5-2F4E-ACCE-6CEE8CC87456}"/>
-              </a:ext>
-            </a:extLst>
-          </p:cNvPr>
-          <p:cNvSpPr>
-            <a:spLocks noGrp="1"/>
-          </p:cNvSpPr>
-          <p:nvPr>
-            <p:ph type="dt" sz="half" idx="10"/>
-          </p:nvPr>
-        </p:nvSpPr>
-        <p:spPr/>
-        <p:txBody>
-          <a:bodyPr/>
-          <a:lstStyle/>
-          <a:p>
-            <a:fld id="{5DAAA6BA-0F4E-49B5-BB9C-DAC12EFCD836}" type="datetime1">
-              <a:rPr lang="de-DE" smtClean="0"/>
-              <a:t>21.05.20</a:t>
-            </a:fld>
-            <a:endParaRPr lang="en-GB" dirty="0"/>
-          </a:p>
-        </p:txBody>
-      </p:sp>
-      <p:sp>
-        <p:nvSpPr>
-          <p:cNvPr id="3" name="Footer Placeholder 2">
-            <a:extLst>
-              <a:ext uri="{FF2B5EF4-FFF2-40B4-BE49-F238E27FC236}">
-                <a16:creationId xmlns:a16="http://schemas.microsoft.com/office/drawing/2014/main" id="{4E3F458E-A457-F742-B71D-BE37A29A7A60}"/>
-              </a:ext>
-            </a:extLst>
-          </p:cNvPr>
-          <p:cNvSpPr>
-            <a:spLocks noGrp="1"/>
-          </p:cNvSpPr>
-          <p:nvPr>
-            <p:ph type="ftr" sz="quarter" idx="11"/>
-          </p:nvPr>
-        </p:nvSpPr>
-        <p:spPr/>
-        <p:txBody>
-          <a:bodyPr/>
-          <a:lstStyle/>
-          <a:p>
-            <a:r>
-              <a:rPr lang="en-GB"/>
-              <a:t>Team 007</a:t>
-            </a:r>
-            <a:endParaRPr lang="en-GB" dirty="0"/>
-          </a:p>
-        </p:txBody>
-      </p:sp>
-      <p:sp>
-        <p:nvSpPr>
-          <p:cNvPr id="4" name="Slide Number Placeholder 3">
-            <a:extLst>
-              <a:ext uri="{FF2B5EF4-FFF2-40B4-BE49-F238E27FC236}">
-                <a16:creationId xmlns:a16="http://schemas.microsoft.com/office/drawing/2014/main" id="{60A44C6D-C4E0-6F40-A0D0-8CECA95D1338}"/>
-              </a:ext>
-            </a:extLst>
-          </p:cNvPr>
-          <p:cNvSpPr>
-            <a:spLocks noGrp="1"/>
-          </p:cNvSpPr>
-          <p:nvPr>
-            <p:ph type="sldNum" sz="quarter" idx="12"/>
-          </p:nvPr>
-        </p:nvSpPr>
-        <p:spPr/>
-        <p:txBody>
-          <a:bodyPr/>
-          <a:lstStyle/>
-          <a:p>
-            <a:fld id="{6C6AE60A-B69C-4790-82F7-3882EDF23186}" type="slidenum">
-              <a:rPr lang="en-GB" smtClean="0"/>
-              <a:t>6</a:t>
-            </a:fld>
-            <a:endParaRPr lang="en-GB" dirty="0"/>
-          </a:p>
-        </p:txBody>
-      </p:sp>
-      <p:sp>
-        <p:nvSpPr>
-          <p:cNvPr id="5" name="Title 4">
-            <a:extLst>
-              <a:ext uri="{FF2B5EF4-FFF2-40B4-BE49-F238E27FC236}">
-                <a16:creationId xmlns:a16="http://schemas.microsoft.com/office/drawing/2014/main" id="{425D3FE5-ED44-AC4D-ACDB-C047337EA1CF}"/>
-              </a:ext>
-            </a:extLst>
-          </p:cNvPr>
-          <p:cNvSpPr>
-            <a:spLocks noGrp="1"/>
-          </p:cNvSpPr>
-          <p:nvPr>
-            <p:ph type="title"/>
-          </p:nvPr>
-        </p:nvSpPr>
-        <p:spPr/>
-        <p:txBody>
-          <a:bodyPr/>
-          <a:lstStyle/>
-          <a:p>
-            <a:r>
-              <a:rPr lang="en-US" sz="3200" dirty="0">
-                <a:latin typeface="Calibri" panose="020F0502020204030204" pitchFamily="34" charset="0"/>
-                <a:cs typeface="Calibri" panose="020F0502020204030204" pitchFamily="34" charset="0"/>
-              </a:rPr>
-              <a:t>AVX </a:t>
-            </a:r>
-            <a:r>
-              <a:rPr lang="en-US" sz="3200" dirty="0" err="1">
-                <a:latin typeface="Calibri" panose="020F0502020204030204" pitchFamily="34" charset="0"/>
-                <a:cs typeface="Calibri" panose="020F0502020204030204" pitchFamily="34" charset="0"/>
-              </a:rPr>
-              <a:t>optimisations</a:t>
-            </a:r>
-            <a:endParaRPr lang="en-US" sz="3200" dirty="0">
-              <a:latin typeface="Calibri" panose="020F0502020204030204" pitchFamily="34" charset="0"/>
-              <a:cs typeface="Calibri" panose="020F0502020204030204" pitchFamily="34" charset="0"/>
-            </a:endParaRPr>
-          </a:p>
-        </p:txBody>
-      </p:sp>
-    </p:spTree>
-    <p:extLst>
-      <p:ext uri="{BB962C8B-B14F-4D97-AF65-F5344CB8AC3E}">
-        <p14:creationId xmlns:p14="http://schemas.microsoft.com/office/powerpoint/2010/main" val="3839603952"/>
-      </p:ext>
-    </p:extLst>
-  </p:cSld>
-  <p:clrMapOvr>
-    <a:masterClrMapping/>
-  </p:clrMapOvr>
-  <p:transition>
-    <p:fade/>
-  </p:transition>
-</p:sld>
-</file>
-
-<file path=ppt/slides/slide7.xml><?xml version="1.0" encoding="utf-8"?>
-<p:sld xmlns:a="http://schemas.openxmlformats.org/drawingml/2006/main" xmlns:r="http://schemas.openxmlformats.org/officeDocument/2006/relationships" xmlns:p="http://schemas.openxmlformats.org/presentationml/2006/main">
-  <p:cSld>
-    <p:spTree>
-      <p:nvGrpSpPr>
-        <p:cNvPr id="1" name=""/>
-        <p:cNvGrpSpPr/>
-        <p:nvPr/>
-      </p:nvGrpSpPr>
-      <p:grpSpPr>
-        <a:xfrm>
-          <a:off x="0" y="0"/>
-          <a:ext cx="0" cy="0"/>
-          <a:chOff x="0" y="0"/>
-          <a:chExt cx="0" cy="0"/>
-        </a:xfrm>
-      </p:grpSpPr>
-      <p:sp>
-        <p:nvSpPr>
-          <p:cNvPr id="2" name="Date Placeholder 1">
-            <a:extLst>
-              <a:ext uri="{FF2B5EF4-FFF2-40B4-BE49-F238E27FC236}">
                 <a16:creationId xmlns:a16="http://schemas.microsoft.com/office/drawing/2014/main" id="{29BCF1F4-B51B-0A4C-AB7B-FB1071ABC126}"/>
               </a:ext>
             </a:extLst>
@@ -45584,7 +45061,7 @@
           <a:p>
             <a:fld id="{6C6AE60A-B69C-4790-82F7-3882EDF23186}" type="slidenum">
               <a:rPr lang="en-GB" smtClean="0"/>
-              <a:t>7</a:t>
+              <a:t>4</a:t>
             </a:fld>
             <a:endParaRPr lang="en-GB" dirty="0"/>
           </a:p>
@@ -45740,6 +45217,529 @@
 </p:sld>
 </file>
 
+<file path=ppt/slides/slide5.xml><?xml version="1.0" encoding="utf-8"?>
+<p:sld xmlns:a="http://schemas.openxmlformats.org/drawingml/2006/main" xmlns:r="http://schemas.openxmlformats.org/officeDocument/2006/relationships" xmlns:p="http://schemas.openxmlformats.org/presentationml/2006/main">
+  <p:cSld>
+    <p:spTree>
+      <p:nvGrpSpPr>
+        <p:cNvPr id="1" name=""/>
+        <p:cNvGrpSpPr/>
+        <p:nvPr/>
+      </p:nvGrpSpPr>
+      <p:grpSpPr>
+        <a:xfrm>
+          <a:off x="0" y="0"/>
+          <a:ext cx="0" cy="0"/>
+          <a:chOff x="0" y="0"/>
+          <a:chExt cx="0" cy="0"/>
+        </a:xfrm>
+      </p:grpSpPr>
+      <p:sp>
+        <p:nvSpPr>
+          <p:cNvPr id="2" name="Date Placeholder 1">
+            <a:extLst>
+              <a:ext uri="{FF2B5EF4-FFF2-40B4-BE49-F238E27FC236}">
+                <a16:creationId xmlns:a16="http://schemas.microsoft.com/office/drawing/2014/main" id="{4A7A086E-2E7A-664F-93EC-3FC61809C00D}"/>
+              </a:ext>
+            </a:extLst>
+          </p:cNvPr>
+          <p:cNvSpPr>
+            <a:spLocks noGrp="1"/>
+          </p:cNvSpPr>
+          <p:nvPr>
+            <p:ph type="dt" sz="half" idx="10"/>
+          </p:nvPr>
+        </p:nvSpPr>
+        <p:spPr/>
+        <p:txBody>
+          <a:bodyPr/>
+          <a:lstStyle/>
+          <a:p>
+            <a:fld id="{5DAAA6BA-0F4E-49B5-BB9C-DAC12EFCD836}" type="datetime1">
+              <a:rPr lang="de-DE" smtClean="0"/>
+              <a:t>21.05.20</a:t>
+            </a:fld>
+            <a:endParaRPr lang="en-GB" dirty="0"/>
+          </a:p>
+        </p:txBody>
+      </p:sp>
+      <p:sp>
+        <p:nvSpPr>
+          <p:cNvPr id="3" name="Footer Placeholder 2">
+            <a:extLst>
+              <a:ext uri="{FF2B5EF4-FFF2-40B4-BE49-F238E27FC236}">
+                <a16:creationId xmlns:a16="http://schemas.microsoft.com/office/drawing/2014/main" id="{9CD839C2-6D65-9940-833A-7EA02B940E55}"/>
+              </a:ext>
+            </a:extLst>
+          </p:cNvPr>
+          <p:cNvSpPr>
+            <a:spLocks noGrp="1"/>
+          </p:cNvSpPr>
+          <p:nvPr>
+            <p:ph type="ftr" sz="quarter" idx="11"/>
+          </p:nvPr>
+        </p:nvSpPr>
+        <p:spPr/>
+        <p:txBody>
+          <a:bodyPr/>
+          <a:lstStyle/>
+          <a:p>
+            <a:r>
+              <a:rPr lang="en-GB"/>
+              <a:t>Team 007</a:t>
+            </a:r>
+            <a:endParaRPr lang="en-GB" dirty="0"/>
+          </a:p>
+        </p:txBody>
+      </p:sp>
+      <p:sp>
+        <p:nvSpPr>
+          <p:cNvPr id="4" name="Slide Number Placeholder 3">
+            <a:extLst>
+              <a:ext uri="{FF2B5EF4-FFF2-40B4-BE49-F238E27FC236}">
+                <a16:creationId xmlns:a16="http://schemas.microsoft.com/office/drawing/2014/main" id="{9ABDEC74-F614-A14D-BA57-A4D56BF20DB8}"/>
+              </a:ext>
+            </a:extLst>
+          </p:cNvPr>
+          <p:cNvSpPr>
+            <a:spLocks noGrp="1"/>
+          </p:cNvSpPr>
+          <p:nvPr>
+            <p:ph type="sldNum" sz="quarter" idx="12"/>
+          </p:nvPr>
+        </p:nvSpPr>
+        <p:spPr/>
+        <p:txBody>
+          <a:bodyPr/>
+          <a:lstStyle/>
+          <a:p>
+            <a:fld id="{6C6AE60A-B69C-4790-82F7-3882EDF23186}" type="slidenum">
+              <a:rPr lang="en-GB" smtClean="0"/>
+              <a:t>5</a:t>
+            </a:fld>
+            <a:endParaRPr lang="en-GB" dirty="0"/>
+          </a:p>
+        </p:txBody>
+      </p:sp>
+      <p:sp>
+        <p:nvSpPr>
+          <p:cNvPr id="5" name="Title 4">
+            <a:extLst>
+              <a:ext uri="{FF2B5EF4-FFF2-40B4-BE49-F238E27FC236}">
+                <a16:creationId xmlns:a16="http://schemas.microsoft.com/office/drawing/2014/main" id="{D56DDB95-37F1-0B47-91FF-7C0BFAA2C48A}"/>
+              </a:ext>
+            </a:extLst>
+          </p:cNvPr>
+          <p:cNvSpPr>
+            <a:spLocks noGrp="1"/>
+          </p:cNvSpPr>
+          <p:nvPr>
+            <p:ph type="title"/>
+          </p:nvPr>
+        </p:nvSpPr>
+        <p:spPr/>
+        <p:txBody>
+          <a:bodyPr/>
+          <a:lstStyle/>
+          <a:p>
+            <a:r>
+              <a:rPr lang="en-US" sz="3200" dirty="0">
+                <a:latin typeface="Calibri" panose="020F0502020204030204" pitchFamily="34" charset="0"/>
+                <a:cs typeface="Calibri" panose="020F0502020204030204" pitchFamily="34" charset="0"/>
+              </a:rPr>
+              <a:t>Baseline Implementation</a:t>
+            </a:r>
+          </a:p>
+        </p:txBody>
+      </p:sp>
+      <p:sp>
+        <p:nvSpPr>
+          <p:cNvPr id="6" name="TextBox 5">
+            <a:extLst>
+              <a:ext uri="{FF2B5EF4-FFF2-40B4-BE49-F238E27FC236}">
+                <a16:creationId xmlns:a16="http://schemas.microsoft.com/office/drawing/2014/main" id="{16F5FF34-BFE2-D048-BBCA-E5FFA63F0B42}"/>
+              </a:ext>
+            </a:extLst>
+          </p:cNvPr>
+          <p:cNvSpPr txBox="1"/>
+          <p:nvPr/>
+        </p:nvSpPr>
+        <p:spPr>
+          <a:xfrm>
+            <a:off x="323850" y="1408048"/>
+            <a:ext cx="3038011" cy="369332"/>
+          </a:xfrm>
+          <a:prstGeom prst="rect">
+            <a:avLst/>
+          </a:prstGeom>
+          <a:noFill/>
+        </p:spPr>
+        <p:txBody>
+          <a:bodyPr wrap="none" rtlCol="0">
+            <a:spAutoFit/>
+          </a:bodyPr>
+          <a:lstStyle/>
+          <a:p>
+            <a:pPr marL="285750" indent="-285750">
+              <a:buFont typeface="Wingdings" pitchFamily="2" charset="2"/>
+              <a:buChar char="§"/>
+            </a:pPr>
+            <a:r>
+              <a:rPr lang="en-US" b="1" i="1" dirty="0" err="1"/>
+              <a:t>ezSIFT</a:t>
+            </a:r>
+            <a:r>
+              <a:rPr lang="en-US" b="1" i="1" dirty="0"/>
+              <a:t> </a:t>
+            </a:r>
+            <a:r>
+              <a:rPr lang="en-US" dirty="0"/>
+              <a:t>as benchmarking</a:t>
+            </a:r>
+            <a:endParaRPr lang="en-US" b="1" i="1" dirty="0"/>
+          </a:p>
+        </p:txBody>
+      </p:sp>
+    </p:spTree>
+    <p:extLst>
+      <p:ext uri="{BB962C8B-B14F-4D97-AF65-F5344CB8AC3E}">
+        <p14:creationId xmlns:p14="http://schemas.microsoft.com/office/powerpoint/2010/main" val="1234454889"/>
+      </p:ext>
+    </p:extLst>
+  </p:cSld>
+  <p:clrMapOvr>
+    <a:masterClrMapping/>
+  </p:clrMapOvr>
+  <p:transition>
+    <p:fade/>
+  </p:transition>
+</p:sld>
+</file>
+
+<file path=ppt/slides/slide6.xml><?xml version="1.0" encoding="utf-8"?>
+<p:sld xmlns:a="http://schemas.openxmlformats.org/drawingml/2006/main" xmlns:r="http://schemas.openxmlformats.org/officeDocument/2006/relationships" xmlns:p="http://schemas.openxmlformats.org/presentationml/2006/main">
+  <p:cSld>
+    <p:spTree>
+      <p:nvGrpSpPr>
+        <p:cNvPr id="1" name=""/>
+        <p:cNvGrpSpPr/>
+        <p:nvPr/>
+      </p:nvGrpSpPr>
+      <p:grpSpPr>
+        <a:xfrm>
+          <a:off x="0" y="0"/>
+          <a:ext cx="0" cy="0"/>
+          <a:chOff x="0" y="0"/>
+          <a:chExt cx="0" cy="0"/>
+        </a:xfrm>
+      </p:grpSpPr>
+      <p:sp>
+        <p:nvSpPr>
+          <p:cNvPr id="2" name="Date Placeholder 1">
+            <a:extLst>
+              <a:ext uri="{FF2B5EF4-FFF2-40B4-BE49-F238E27FC236}">
+                <a16:creationId xmlns:a16="http://schemas.microsoft.com/office/drawing/2014/main" id="{C03172AE-DF41-7249-955A-3C32CA18F196}"/>
+              </a:ext>
+            </a:extLst>
+          </p:cNvPr>
+          <p:cNvSpPr>
+            <a:spLocks noGrp="1"/>
+          </p:cNvSpPr>
+          <p:nvPr>
+            <p:ph type="dt" sz="half" idx="10"/>
+          </p:nvPr>
+        </p:nvSpPr>
+        <p:spPr/>
+        <p:txBody>
+          <a:bodyPr/>
+          <a:lstStyle/>
+          <a:p>
+            <a:fld id="{5DAAA6BA-0F4E-49B5-BB9C-DAC12EFCD836}" type="datetime1">
+              <a:rPr lang="de-DE" smtClean="0"/>
+              <a:t>21.05.20</a:t>
+            </a:fld>
+            <a:endParaRPr lang="en-GB" dirty="0"/>
+          </a:p>
+        </p:txBody>
+      </p:sp>
+      <p:sp>
+        <p:nvSpPr>
+          <p:cNvPr id="3" name="Footer Placeholder 2">
+            <a:extLst>
+              <a:ext uri="{FF2B5EF4-FFF2-40B4-BE49-F238E27FC236}">
+                <a16:creationId xmlns:a16="http://schemas.microsoft.com/office/drawing/2014/main" id="{DF91D8B5-5156-EC42-844E-87EE108A2AFA}"/>
+              </a:ext>
+            </a:extLst>
+          </p:cNvPr>
+          <p:cNvSpPr>
+            <a:spLocks noGrp="1"/>
+          </p:cNvSpPr>
+          <p:nvPr>
+            <p:ph type="ftr" sz="quarter" idx="11"/>
+          </p:nvPr>
+        </p:nvSpPr>
+        <p:spPr/>
+        <p:txBody>
+          <a:bodyPr/>
+          <a:lstStyle/>
+          <a:p>
+            <a:r>
+              <a:rPr lang="en-GB"/>
+              <a:t>Team 007</a:t>
+            </a:r>
+            <a:endParaRPr lang="en-GB" dirty="0"/>
+          </a:p>
+        </p:txBody>
+      </p:sp>
+      <p:sp>
+        <p:nvSpPr>
+          <p:cNvPr id="4" name="Slide Number Placeholder 3">
+            <a:extLst>
+              <a:ext uri="{FF2B5EF4-FFF2-40B4-BE49-F238E27FC236}">
+                <a16:creationId xmlns:a16="http://schemas.microsoft.com/office/drawing/2014/main" id="{1227E194-A41B-BE49-9FEF-8C192C660303}"/>
+              </a:ext>
+            </a:extLst>
+          </p:cNvPr>
+          <p:cNvSpPr>
+            <a:spLocks noGrp="1"/>
+          </p:cNvSpPr>
+          <p:nvPr>
+            <p:ph type="sldNum" sz="quarter" idx="12"/>
+          </p:nvPr>
+        </p:nvSpPr>
+        <p:spPr/>
+        <p:txBody>
+          <a:bodyPr/>
+          <a:lstStyle/>
+          <a:p>
+            <a:fld id="{6C6AE60A-B69C-4790-82F7-3882EDF23186}" type="slidenum">
+              <a:rPr lang="en-GB" smtClean="0"/>
+              <a:t>6</a:t>
+            </a:fld>
+            <a:endParaRPr lang="en-GB" dirty="0"/>
+          </a:p>
+        </p:txBody>
+      </p:sp>
+      <p:sp>
+        <p:nvSpPr>
+          <p:cNvPr id="5" name="Title 4">
+            <a:extLst>
+              <a:ext uri="{FF2B5EF4-FFF2-40B4-BE49-F238E27FC236}">
+                <a16:creationId xmlns:a16="http://schemas.microsoft.com/office/drawing/2014/main" id="{D67EBCE5-916E-E745-8C8F-75C0176456DB}"/>
+              </a:ext>
+            </a:extLst>
+          </p:cNvPr>
+          <p:cNvSpPr>
+            <a:spLocks noGrp="1"/>
+          </p:cNvSpPr>
+          <p:nvPr>
+            <p:ph type="title"/>
+          </p:nvPr>
+        </p:nvSpPr>
+        <p:spPr/>
+        <p:txBody>
+          <a:bodyPr/>
+          <a:lstStyle/>
+          <a:p>
+            <a:r>
+              <a:rPr lang="en-US" sz="3200" dirty="0">
+                <a:latin typeface="Calibri" panose="020F0502020204030204" pitchFamily="34" charset="0"/>
+                <a:cs typeface="Calibri" panose="020F0502020204030204" pitchFamily="34" charset="0"/>
+              </a:rPr>
+              <a:t>Standard C </a:t>
+            </a:r>
+            <a:r>
+              <a:rPr lang="en-US" sz="3200" dirty="0" err="1">
+                <a:latin typeface="Calibri" panose="020F0502020204030204" pitchFamily="34" charset="0"/>
+                <a:cs typeface="Calibri" panose="020F0502020204030204" pitchFamily="34" charset="0"/>
+              </a:rPr>
+              <a:t>optimisations</a:t>
+            </a:r>
+            <a:endParaRPr lang="en-US" sz="3200" dirty="0">
+              <a:latin typeface="Calibri" panose="020F0502020204030204" pitchFamily="34" charset="0"/>
+              <a:cs typeface="Calibri" panose="020F0502020204030204" pitchFamily="34" charset="0"/>
+            </a:endParaRPr>
+          </a:p>
+        </p:txBody>
+      </p:sp>
+    </p:spTree>
+    <p:extLst>
+      <p:ext uri="{BB962C8B-B14F-4D97-AF65-F5344CB8AC3E}">
+        <p14:creationId xmlns:p14="http://schemas.microsoft.com/office/powerpoint/2010/main" val="1999106558"/>
+      </p:ext>
+    </p:extLst>
+  </p:cSld>
+  <p:clrMapOvr>
+    <a:masterClrMapping/>
+  </p:clrMapOvr>
+  <p:transition>
+    <p:fade/>
+  </p:transition>
+</p:sld>
+</file>
+
+<file path=ppt/slides/slide7.xml><?xml version="1.0" encoding="utf-8"?>
+<p:sld xmlns:a="http://schemas.openxmlformats.org/drawingml/2006/main" xmlns:r="http://schemas.openxmlformats.org/officeDocument/2006/relationships" xmlns:p="http://schemas.openxmlformats.org/presentationml/2006/main">
+  <p:cSld>
+    <p:spTree>
+      <p:nvGrpSpPr>
+        <p:cNvPr id="1" name=""/>
+        <p:cNvGrpSpPr/>
+        <p:nvPr/>
+      </p:nvGrpSpPr>
+      <p:grpSpPr>
+        <a:xfrm>
+          <a:off x="0" y="0"/>
+          <a:ext cx="0" cy="0"/>
+          <a:chOff x="0" y="0"/>
+          <a:chExt cx="0" cy="0"/>
+        </a:xfrm>
+      </p:grpSpPr>
+      <p:sp>
+        <p:nvSpPr>
+          <p:cNvPr id="2" name="Date Placeholder 1">
+            <a:extLst>
+              <a:ext uri="{FF2B5EF4-FFF2-40B4-BE49-F238E27FC236}">
+                <a16:creationId xmlns:a16="http://schemas.microsoft.com/office/drawing/2014/main" id="{0CAB53FB-6BD5-2F4E-ACCE-6CEE8CC87456}"/>
+              </a:ext>
+            </a:extLst>
+          </p:cNvPr>
+          <p:cNvSpPr>
+            <a:spLocks noGrp="1"/>
+          </p:cNvSpPr>
+          <p:nvPr>
+            <p:ph type="dt" sz="half" idx="10"/>
+          </p:nvPr>
+        </p:nvSpPr>
+        <p:spPr/>
+        <p:txBody>
+          <a:bodyPr/>
+          <a:lstStyle/>
+          <a:p>
+            <a:fld id="{5DAAA6BA-0F4E-49B5-BB9C-DAC12EFCD836}" type="datetime1">
+              <a:rPr lang="de-DE" smtClean="0"/>
+              <a:t>22.05.20</a:t>
+            </a:fld>
+            <a:endParaRPr lang="en-GB" dirty="0"/>
+          </a:p>
+        </p:txBody>
+      </p:sp>
+      <p:sp>
+        <p:nvSpPr>
+          <p:cNvPr id="3" name="Footer Placeholder 2">
+            <a:extLst>
+              <a:ext uri="{FF2B5EF4-FFF2-40B4-BE49-F238E27FC236}">
+                <a16:creationId xmlns:a16="http://schemas.microsoft.com/office/drawing/2014/main" id="{4E3F458E-A457-F742-B71D-BE37A29A7A60}"/>
+              </a:ext>
+            </a:extLst>
+          </p:cNvPr>
+          <p:cNvSpPr>
+            <a:spLocks noGrp="1"/>
+          </p:cNvSpPr>
+          <p:nvPr>
+            <p:ph type="ftr" sz="quarter" idx="11"/>
+          </p:nvPr>
+        </p:nvSpPr>
+        <p:spPr/>
+        <p:txBody>
+          <a:bodyPr/>
+          <a:lstStyle/>
+          <a:p>
+            <a:r>
+              <a:rPr lang="en-GB"/>
+              <a:t>Team 007</a:t>
+            </a:r>
+            <a:endParaRPr lang="en-GB" dirty="0"/>
+          </a:p>
+        </p:txBody>
+      </p:sp>
+      <p:sp>
+        <p:nvSpPr>
+          <p:cNvPr id="4" name="Slide Number Placeholder 3">
+            <a:extLst>
+              <a:ext uri="{FF2B5EF4-FFF2-40B4-BE49-F238E27FC236}">
+                <a16:creationId xmlns:a16="http://schemas.microsoft.com/office/drawing/2014/main" id="{60A44C6D-C4E0-6F40-A0D0-8CECA95D1338}"/>
+              </a:ext>
+            </a:extLst>
+          </p:cNvPr>
+          <p:cNvSpPr>
+            <a:spLocks noGrp="1"/>
+          </p:cNvSpPr>
+          <p:nvPr>
+            <p:ph type="sldNum" sz="quarter" idx="12"/>
+          </p:nvPr>
+        </p:nvSpPr>
+        <p:spPr/>
+        <p:txBody>
+          <a:bodyPr/>
+          <a:lstStyle/>
+          <a:p>
+            <a:fld id="{6C6AE60A-B69C-4790-82F7-3882EDF23186}" type="slidenum">
+              <a:rPr lang="en-GB" smtClean="0"/>
+              <a:t>7</a:t>
+            </a:fld>
+            <a:endParaRPr lang="en-GB" dirty="0"/>
+          </a:p>
+        </p:txBody>
+      </p:sp>
+      <p:sp>
+        <p:nvSpPr>
+          <p:cNvPr id="5" name="Title 4">
+            <a:extLst>
+              <a:ext uri="{FF2B5EF4-FFF2-40B4-BE49-F238E27FC236}">
+                <a16:creationId xmlns:a16="http://schemas.microsoft.com/office/drawing/2014/main" id="{425D3FE5-ED44-AC4D-ACDB-C047337EA1CF}"/>
+              </a:ext>
+            </a:extLst>
+          </p:cNvPr>
+          <p:cNvSpPr>
+            <a:spLocks noGrp="1"/>
+          </p:cNvSpPr>
+          <p:nvPr>
+            <p:ph type="title"/>
+          </p:nvPr>
+        </p:nvSpPr>
+        <p:spPr/>
+        <p:txBody>
+          <a:bodyPr/>
+          <a:lstStyle/>
+          <a:p>
+            <a:r>
+              <a:rPr lang="en-US" sz="3200" dirty="0">
+                <a:latin typeface="Calibri" panose="020F0502020204030204" pitchFamily="34" charset="0"/>
+                <a:cs typeface="Calibri" panose="020F0502020204030204" pitchFamily="34" charset="0"/>
+              </a:rPr>
+              <a:t>AVX </a:t>
+            </a:r>
+            <a:r>
+              <a:rPr lang="en-US" sz="3200" dirty="0" err="1">
+                <a:latin typeface="Calibri" panose="020F0502020204030204" pitchFamily="34" charset="0"/>
+                <a:cs typeface="Calibri" panose="020F0502020204030204" pitchFamily="34" charset="0"/>
+              </a:rPr>
+              <a:t>optimisations</a:t>
+            </a:r>
+            <a:endParaRPr lang="en-US" sz="3200" dirty="0">
+              <a:latin typeface="Calibri" panose="020F0502020204030204" pitchFamily="34" charset="0"/>
+              <a:cs typeface="Calibri" panose="020F0502020204030204" pitchFamily="34" charset="0"/>
+            </a:endParaRPr>
+          </a:p>
+        </p:txBody>
+      </p:sp>
+    </p:spTree>
+    <p:extLst>
+      <p:ext uri="{BB962C8B-B14F-4D97-AF65-F5344CB8AC3E}">
+        <p14:creationId xmlns:p14="http://schemas.microsoft.com/office/powerpoint/2010/main" val="3839603952"/>
+      </p:ext>
+    </p:extLst>
+  </p:cSld>
+  <p:clrMapOvr>
+    <a:masterClrMapping/>
+  </p:clrMapOvr>
+  <p:transition>
+    <p:fade/>
+  </p:transition>
+</p:sld>
+</file>
+
 <file path=ppt/slides/slide8.xml><?xml version="1.0" encoding="utf-8"?>
 <p:sld xmlns:a="http://schemas.openxmlformats.org/drawingml/2006/main" xmlns:r="http://schemas.openxmlformats.org/officeDocument/2006/relationships" xmlns:p="http://schemas.openxmlformats.org/presentationml/2006/main">
   <p:cSld>
@@ -45780,7 +45780,7 @@
           <a:p>
             <a:fld id="{5DAAA6BA-0F4E-49B5-BB9C-DAC12EFCD836}" type="datetime1">
               <a:rPr lang="de-DE" smtClean="0"/>
-              <a:t>21.05.20</a:t>
+              <a:t>23.05.20</a:t>
             </a:fld>
             <a:endParaRPr lang="en-GB" dirty="0"/>
           </a:p>
@@ -45865,7 +45865,494 @@
           <a:bodyPr/>
           <a:lstStyle/>
           <a:p>
-            <a:endParaRPr lang="en-US"/>
+            <a:r>
+              <a:rPr lang="en-US" sz="3200" dirty="0">
+                <a:latin typeface="Calibri" panose="020F0502020204030204" pitchFamily="34" charset="0"/>
+                <a:cs typeface="Calibri" panose="020F0502020204030204" pitchFamily="34" charset="0"/>
+              </a:rPr>
+              <a:t>Additional Observations</a:t>
+            </a:r>
+          </a:p>
+        </p:txBody>
+      </p:sp>
+      <p:sp>
+        <p:nvSpPr>
+          <p:cNvPr id="6" name="TextBox 5">
+            <a:extLst>
+              <a:ext uri="{FF2B5EF4-FFF2-40B4-BE49-F238E27FC236}">
+                <a16:creationId xmlns:a16="http://schemas.microsoft.com/office/drawing/2014/main" id="{AB109615-1BFC-6746-BD83-1DEA7A89C65D}"/>
+              </a:ext>
+            </a:extLst>
+          </p:cNvPr>
+          <p:cNvSpPr txBox="1"/>
+          <p:nvPr/>
+        </p:nvSpPr>
+        <p:spPr>
+          <a:xfrm>
+            <a:off x="323850" y="1273394"/>
+            <a:ext cx="5878986" cy="5161413"/>
+          </a:xfrm>
+          <a:prstGeom prst="rect">
+            <a:avLst/>
+          </a:prstGeom>
+          <a:noFill/>
+        </p:spPr>
+        <p:txBody>
+          <a:bodyPr wrap="square" rtlCol="0">
+            <a:spAutoFit/>
+          </a:bodyPr>
+          <a:lstStyle/>
+          <a:p>
+            <a:pPr marL="285750" indent="-285750">
+              <a:lnSpc>
+                <a:spcPct val="150000"/>
+              </a:lnSpc>
+              <a:spcBef>
+                <a:spcPts val="600"/>
+              </a:spcBef>
+              <a:buFont typeface="Wingdings" pitchFamily="2" charset="2"/>
+              <a:buChar char="q"/>
+            </a:pPr>
+            <a:r>
+              <a:rPr lang="en-US" sz="2000" dirty="0" err="1">
+                <a:latin typeface="Calibri" panose="020F0502020204030204" pitchFamily="34" charset="0"/>
+                <a:cs typeface="Calibri" panose="020F0502020204030204" pitchFamily="34" charset="0"/>
+              </a:rPr>
+              <a:t>ezSIFT</a:t>
+            </a:r>
+            <a:r>
+              <a:rPr lang="en-US" sz="2000" dirty="0">
+                <a:latin typeface="Calibri" panose="020F0502020204030204" pitchFamily="34" charset="0"/>
+                <a:cs typeface="Calibri" panose="020F0502020204030204" pitchFamily="34" charset="0"/>
+              </a:rPr>
+              <a:t> </a:t>
+            </a:r>
+            <a:r>
+              <a:rPr lang="en-US" sz="2000" b="1" i="1" dirty="0">
+                <a:latin typeface="Calibri" panose="020F0502020204030204" pitchFamily="34" charset="0"/>
+                <a:cs typeface="Calibri" panose="020F0502020204030204" pitchFamily="34" charset="0"/>
+              </a:rPr>
+              <a:t>leaks</a:t>
+            </a:r>
+            <a:r>
+              <a:rPr lang="en-US" sz="2000" dirty="0">
+                <a:latin typeface="Calibri" panose="020F0502020204030204" pitchFamily="34" charset="0"/>
+                <a:cs typeface="Calibri" panose="020F0502020204030204" pitchFamily="34" charset="0"/>
+              </a:rPr>
+              <a:t> memory</a:t>
+            </a:r>
+          </a:p>
+          <a:p>
+            <a:pPr marL="285750" indent="-285750">
+              <a:lnSpc>
+                <a:spcPct val="200000"/>
+              </a:lnSpc>
+              <a:spcBef>
+                <a:spcPts val="600"/>
+              </a:spcBef>
+              <a:buFont typeface="Wingdings" pitchFamily="2" charset="2"/>
+              <a:buChar char="q"/>
+            </a:pPr>
+            <a:r>
+              <a:rPr lang="en-GB" sz="2000" b="1" dirty="0">
+                <a:solidFill>
+                  <a:srgbClr val="00B050"/>
+                </a:solidFill>
+                <a:latin typeface="Calibri" panose="020F0502020204030204" pitchFamily="34" charset="0"/>
+                <a:cs typeface="Calibri" panose="020F0502020204030204" pitchFamily="34" charset="0"/>
+              </a:rPr>
+              <a:t>Helped</a:t>
+            </a:r>
+            <a:r>
+              <a:rPr lang="en-GB" sz="2000" dirty="0">
+                <a:latin typeface="Calibri" panose="020F0502020204030204" pitchFamily="34" charset="0"/>
+                <a:cs typeface="Calibri" panose="020F0502020204030204" pitchFamily="34" charset="0"/>
+              </a:rPr>
+              <a:t> performance:</a:t>
+            </a:r>
+          </a:p>
+          <a:p>
+            <a:pPr marL="742950" lvl="1" indent="-285750">
+              <a:lnSpc>
+                <a:spcPct val="150000"/>
+              </a:lnSpc>
+              <a:spcBef>
+                <a:spcPts val="600"/>
+              </a:spcBef>
+              <a:buFont typeface="Wingdings" pitchFamily="2" charset="2"/>
+              <a:buChar char="q"/>
+            </a:pPr>
+            <a:r>
+              <a:rPr lang="en-GB" sz="2000" b="1" i="1" dirty="0">
+                <a:latin typeface="Calibri" panose="020F0502020204030204" pitchFamily="34" charset="0"/>
+                <a:cs typeface="Calibri" panose="020F0502020204030204" pitchFamily="34" charset="0"/>
+              </a:rPr>
+              <a:t>Variable declarations</a:t>
+            </a:r>
+            <a:r>
+              <a:rPr lang="en-GB" sz="2000" dirty="0">
+                <a:latin typeface="Calibri" panose="020F0502020204030204" pitchFamily="34" charset="0"/>
+                <a:cs typeface="Calibri" panose="020F0502020204030204" pitchFamily="34" charset="0"/>
+              </a:rPr>
+              <a:t> close to point of use </a:t>
+            </a:r>
+          </a:p>
+          <a:p>
+            <a:pPr marL="800100" lvl="1" indent="-342900">
+              <a:lnSpc>
+                <a:spcPct val="150000"/>
+              </a:lnSpc>
+              <a:spcBef>
+                <a:spcPts val="600"/>
+              </a:spcBef>
+              <a:buFont typeface="Wingdings" pitchFamily="2" charset="2"/>
+              <a:buChar char="q"/>
+            </a:pPr>
+            <a:r>
+              <a:rPr lang="en-GB" sz="2000" dirty="0">
+                <a:latin typeface="Calibri" panose="020F0502020204030204" pitchFamily="34" charset="0"/>
+                <a:cs typeface="Calibri" panose="020F0502020204030204" pitchFamily="34" charset="0"/>
+              </a:rPr>
+              <a:t>Declaring </a:t>
+            </a:r>
+            <a:r>
+              <a:rPr lang="en-GB" sz="2000" b="1" dirty="0" err="1">
+                <a:latin typeface="Calibri" panose="020F0502020204030204" pitchFamily="34" charset="0"/>
+                <a:cs typeface="Calibri" panose="020F0502020204030204" pitchFamily="34" charset="0"/>
+              </a:rPr>
+              <a:t>const</a:t>
+            </a:r>
+            <a:endParaRPr lang="en-GB" sz="2000" dirty="0">
+              <a:latin typeface="Calibri" panose="020F0502020204030204" pitchFamily="34" charset="0"/>
+              <a:cs typeface="Calibri" panose="020F0502020204030204" pitchFamily="34" charset="0"/>
+            </a:endParaRPr>
+          </a:p>
+          <a:p>
+            <a:pPr marL="342900" indent="-342900">
+              <a:lnSpc>
+                <a:spcPct val="200000"/>
+              </a:lnSpc>
+              <a:spcBef>
+                <a:spcPts val="600"/>
+              </a:spcBef>
+              <a:buFont typeface="Wingdings" pitchFamily="2" charset="2"/>
+              <a:buChar char="q"/>
+            </a:pPr>
+            <a:r>
+              <a:rPr lang="en-GB" sz="2000" b="1" dirty="0">
+                <a:solidFill>
+                  <a:srgbClr val="C00000"/>
+                </a:solidFill>
+                <a:latin typeface="Calibri" panose="020F0502020204030204" pitchFamily="34" charset="0"/>
+                <a:cs typeface="Calibri" panose="020F0502020204030204" pitchFamily="34" charset="0"/>
+              </a:rPr>
+              <a:t>Worsened</a:t>
+            </a:r>
+            <a:r>
+              <a:rPr lang="en-GB" sz="2000" dirty="0">
+                <a:latin typeface="Calibri" panose="020F0502020204030204" pitchFamily="34" charset="0"/>
+                <a:cs typeface="Calibri" panose="020F0502020204030204" pitchFamily="34" charset="0"/>
+              </a:rPr>
+              <a:t> performance:</a:t>
+            </a:r>
+          </a:p>
+          <a:p>
+            <a:pPr marL="742950" lvl="1" indent="-285750">
+              <a:lnSpc>
+                <a:spcPct val="150000"/>
+              </a:lnSpc>
+              <a:spcBef>
+                <a:spcPts val="600"/>
+              </a:spcBef>
+              <a:buFont typeface="Wingdings" pitchFamily="2" charset="2"/>
+              <a:buChar char="q"/>
+            </a:pPr>
+            <a:r>
+              <a:rPr lang="en-GB" sz="2000" b="1" dirty="0" err="1">
+                <a:latin typeface="Calibri" panose="020F0502020204030204" pitchFamily="34" charset="0"/>
+                <a:cs typeface="Calibri" panose="020F0502020204030204" pitchFamily="34" charset="0"/>
+              </a:rPr>
+              <a:t>size_t</a:t>
+            </a:r>
+            <a:r>
+              <a:rPr lang="en-GB" sz="2000" b="1" dirty="0">
+                <a:latin typeface="Calibri" panose="020F0502020204030204" pitchFamily="34" charset="0"/>
+                <a:cs typeface="Calibri" panose="020F0502020204030204" pitchFamily="34" charset="0"/>
+              </a:rPr>
+              <a:t> </a:t>
+            </a:r>
+            <a:r>
+              <a:rPr lang="en-GB" sz="2000" dirty="0">
+                <a:latin typeface="Calibri" panose="020F0502020204030204" pitchFamily="34" charset="0"/>
+                <a:cs typeface="Calibri" panose="020F0502020204030204" pitchFamily="34" charset="0"/>
+              </a:rPr>
+              <a:t>instead of int</a:t>
+            </a:r>
+          </a:p>
+          <a:p>
+            <a:pPr marL="742950" lvl="1" indent="-285750">
+              <a:lnSpc>
+                <a:spcPct val="150000"/>
+              </a:lnSpc>
+              <a:spcBef>
+                <a:spcPts val="600"/>
+              </a:spcBef>
+              <a:buFont typeface="Wingdings" pitchFamily="2" charset="2"/>
+              <a:buChar char="q"/>
+            </a:pPr>
+            <a:r>
+              <a:rPr lang="en-GB" sz="2000" dirty="0">
+                <a:latin typeface="Calibri" panose="020F0502020204030204" pitchFamily="34" charset="0"/>
+                <a:cs typeface="Calibri" panose="020F0502020204030204" pitchFamily="34" charset="0"/>
+              </a:rPr>
+              <a:t>Forcing </a:t>
+            </a:r>
+            <a:r>
+              <a:rPr lang="en-GB" sz="2000" b="1" i="1" dirty="0">
+                <a:latin typeface="Calibri" panose="020F0502020204030204" pitchFamily="34" charset="0"/>
+                <a:cs typeface="Calibri" panose="020F0502020204030204" pitchFamily="34" charset="0"/>
+              </a:rPr>
+              <a:t>memory</a:t>
+            </a:r>
+            <a:r>
+              <a:rPr lang="en-GB" sz="2000" dirty="0">
+                <a:latin typeface="Calibri" panose="020F0502020204030204" pitchFamily="34" charset="0"/>
+                <a:cs typeface="Calibri" panose="020F0502020204030204" pitchFamily="34" charset="0"/>
+              </a:rPr>
+              <a:t> to be </a:t>
+            </a:r>
+            <a:r>
+              <a:rPr lang="en-GB" sz="2000" b="1" i="1" dirty="0">
+                <a:latin typeface="Calibri" panose="020F0502020204030204" pitchFamily="34" charset="0"/>
+                <a:cs typeface="Calibri" panose="020F0502020204030204" pitchFamily="34" charset="0"/>
+              </a:rPr>
+              <a:t>paged</a:t>
+            </a:r>
+            <a:r>
+              <a:rPr lang="en-GB" sz="2000" dirty="0">
+                <a:latin typeface="Calibri" panose="020F0502020204030204" pitchFamily="34" charset="0"/>
+                <a:cs typeface="Calibri" panose="020F0502020204030204" pitchFamily="34" charset="0"/>
+              </a:rPr>
+              <a:t> in at allocation time</a:t>
+            </a:r>
+          </a:p>
+          <a:p>
+            <a:pPr marL="285750" indent="-285750">
+              <a:lnSpc>
+                <a:spcPct val="200000"/>
+              </a:lnSpc>
+              <a:spcBef>
+                <a:spcPts val="600"/>
+              </a:spcBef>
+              <a:buFont typeface="Wingdings" pitchFamily="2" charset="2"/>
+              <a:buChar char="q"/>
+            </a:pPr>
+            <a:r>
+              <a:rPr lang="en-GB" sz="2000" b="1" i="1" dirty="0">
+                <a:latin typeface="Calibri" panose="020F0502020204030204" pitchFamily="34" charset="0"/>
+                <a:cs typeface="Calibri" panose="020F0502020204030204" pitchFamily="34" charset="0"/>
+              </a:rPr>
+              <a:t>Prefetching</a:t>
+            </a:r>
+            <a:r>
+              <a:rPr lang="en-GB" sz="2000" dirty="0">
+                <a:latin typeface="Calibri" panose="020F0502020204030204" pitchFamily="34" charset="0"/>
+                <a:cs typeface="Calibri" panose="020F0502020204030204" pitchFamily="34" charset="0"/>
+              </a:rPr>
+              <a:t> memory can be hurtful</a:t>
+            </a:r>
+            <a:endParaRPr lang="en-US" sz="2000" dirty="0">
+              <a:latin typeface="Calibri" panose="020F0502020204030204" pitchFamily="34" charset="0"/>
+              <a:cs typeface="Calibri" panose="020F0502020204030204" pitchFamily="34" charset="0"/>
+            </a:endParaRPr>
+          </a:p>
+        </p:txBody>
+      </p:sp>
+      <p:sp>
+        <p:nvSpPr>
+          <p:cNvPr id="8" name="TextBox 7">
+            <a:extLst>
+              <a:ext uri="{FF2B5EF4-FFF2-40B4-BE49-F238E27FC236}">
+                <a16:creationId xmlns:a16="http://schemas.microsoft.com/office/drawing/2014/main" id="{4FE4F1D7-3571-7F44-9D1C-192E9C30C323}"/>
+              </a:ext>
+            </a:extLst>
+          </p:cNvPr>
+          <p:cNvSpPr txBox="1"/>
+          <p:nvPr/>
+        </p:nvSpPr>
+        <p:spPr>
+          <a:xfrm>
+            <a:off x="8295588" y="1592714"/>
+            <a:ext cx="2620923" cy="1323439"/>
+          </a:xfrm>
+          <a:prstGeom prst="rect">
+            <a:avLst/>
+          </a:prstGeom>
+          <a:noFill/>
+          <a:ln>
+            <a:solidFill>
+              <a:schemeClr val="tx1"/>
+            </a:solidFill>
+          </a:ln>
+        </p:spPr>
+        <p:txBody>
+          <a:bodyPr wrap="square" rtlCol="0">
+            <a:spAutoFit/>
+          </a:bodyPr>
+          <a:lstStyle/>
+          <a:p>
+            <a:r>
+              <a:rPr lang="en-US" sz="2000" b="1" u="sng" dirty="0">
+                <a:latin typeface="Calibri" panose="020F0502020204030204" pitchFamily="34" charset="0"/>
+                <a:cs typeface="Calibri" panose="020F0502020204030204" pitchFamily="34" charset="0"/>
+              </a:rPr>
+              <a:t>Without </a:t>
+            </a:r>
+            <a:r>
+              <a:rPr lang="en-US" sz="2000" b="1" u="sng" dirty="0" err="1">
+                <a:latin typeface="Calibri" panose="020F0502020204030204" pitchFamily="34" charset="0"/>
+                <a:cs typeface="Calibri" panose="020F0502020204030204" pitchFamily="34" charset="0"/>
+              </a:rPr>
+              <a:t>optimisations</a:t>
+            </a:r>
+            <a:endParaRPr lang="en-US" sz="2000" b="1" u="sng" dirty="0">
+              <a:latin typeface="Calibri" panose="020F0502020204030204" pitchFamily="34" charset="0"/>
+              <a:cs typeface="Calibri" panose="020F0502020204030204" pitchFamily="34" charset="0"/>
+            </a:endParaRPr>
+          </a:p>
+          <a:p>
+            <a:pPr marL="342900" indent="-342900">
+              <a:buAutoNum type="arabicParenR"/>
+            </a:pPr>
+            <a:r>
+              <a:rPr lang="en-GB" sz="2000" dirty="0">
+                <a:latin typeface="Calibri" panose="020F0502020204030204" pitchFamily="34" charset="0"/>
+                <a:cs typeface="Calibri" panose="020F0502020204030204" pitchFamily="34" charset="0"/>
+              </a:rPr>
+              <a:t>GCC</a:t>
+            </a:r>
+          </a:p>
+          <a:p>
+            <a:pPr marL="342900" indent="-342900">
+              <a:buAutoNum type="arabicParenR"/>
+            </a:pPr>
+            <a:r>
+              <a:rPr lang="en-GB" sz="2000" dirty="0">
+                <a:latin typeface="Calibri" panose="020F0502020204030204" pitchFamily="34" charset="0"/>
+                <a:cs typeface="Calibri" panose="020F0502020204030204" pitchFamily="34" charset="0"/>
+              </a:rPr>
+              <a:t>Clang</a:t>
+            </a:r>
+          </a:p>
+          <a:p>
+            <a:pPr marL="342900" indent="-342900">
+              <a:buAutoNum type="arabicParenR"/>
+            </a:pPr>
+            <a:r>
+              <a:rPr lang="en-GB" sz="2000" dirty="0">
+                <a:latin typeface="Calibri" panose="020F0502020204030204" pitchFamily="34" charset="0"/>
+                <a:cs typeface="Calibri" panose="020F0502020204030204" pitchFamily="34" charset="0"/>
+              </a:rPr>
+              <a:t>ICC</a:t>
+            </a:r>
+            <a:endParaRPr lang="en-US" sz="2000" dirty="0">
+              <a:latin typeface="Calibri" panose="020F0502020204030204" pitchFamily="34" charset="0"/>
+              <a:cs typeface="Calibri" panose="020F0502020204030204" pitchFamily="34" charset="0"/>
+            </a:endParaRPr>
+          </a:p>
+        </p:txBody>
+      </p:sp>
+      <p:sp>
+        <p:nvSpPr>
+          <p:cNvPr id="9" name="TextBox 8">
+            <a:extLst>
+              <a:ext uri="{FF2B5EF4-FFF2-40B4-BE49-F238E27FC236}">
+                <a16:creationId xmlns:a16="http://schemas.microsoft.com/office/drawing/2014/main" id="{4FD14FB7-BCC9-594F-ACF3-04AAFB5DE850}"/>
+              </a:ext>
+            </a:extLst>
+          </p:cNvPr>
+          <p:cNvSpPr txBox="1"/>
+          <p:nvPr/>
+        </p:nvSpPr>
+        <p:spPr>
+          <a:xfrm>
+            <a:off x="8295588" y="3854100"/>
+            <a:ext cx="2620923" cy="1323439"/>
+          </a:xfrm>
+          <a:prstGeom prst="rect">
+            <a:avLst/>
+          </a:prstGeom>
+          <a:noFill/>
+          <a:ln>
+            <a:solidFill>
+              <a:schemeClr val="tx1"/>
+            </a:solidFill>
+          </a:ln>
+        </p:spPr>
+        <p:txBody>
+          <a:bodyPr wrap="square" rtlCol="0">
+            <a:spAutoFit/>
+          </a:bodyPr>
+          <a:lstStyle/>
+          <a:p>
+            <a:r>
+              <a:rPr lang="en-US" sz="2000" b="1" u="sng" dirty="0">
+                <a:latin typeface="Calibri" panose="020F0502020204030204" pitchFamily="34" charset="0"/>
+                <a:cs typeface="Calibri" panose="020F0502020204030204" pitchFamily="34" charset="0"/>
+              </a:rPr>
+              <a:t>With </a:t>
+            </a:r>
+            <a:r>
+              <a:rPr lang="en-US" sz="2000" b="1" u="sng" dirty="0" err="1">
+                <a:latin typeface="Calibri" panose="020F0502020204030204" pitchFamily="34" charset="0"/>
+                <a:cs typeface="Calibri" panose="020F0502020204030204" pitchFamily="34" charset="0"/>
+              </a:rPr>
+              <a:t>optimisations</a:t>
+            </a:r>
+            <a:endParaRPr lang="en-US" sz="2000" b="1" u="sng" dirty="0">
+              <a:latin typeface="Calibri" panose="020F0502020204030204" pitchFamily="34" charset="0"/>
+              <a:cs typeface="Calibri" panose="020F0502020204030204" pitchFamily="34" charset="0"/>
+            </a:endParaRPr>
+          </a:p>
+          <a:p>
+            <a:pPr marL="342900" indent="-342900">
+              <a:buAutoNum type="arabicParenR"/>
+            </a:pPr>
+            <a:r>
+              <a:rPr lang="en-GB" sz="2000" dirty="0">
+                <a:latin typeface="Calibri" panose="020F0502020204030204" pitchFamily="34" charset="0"/>
+                <a:cs typeface="Calibri" panose="020F0502020204030204" pitchFamily="34" charset="0"/>
+              </a:rPr>
+              <a:t>ICC</a:t>
+            </a:r>
+          </a:p>
+          <a:p>
+            <a:pPr marL="342900" indent="-342900">
+              <a:buAutoNum type="arabicParenR"/>
+            </a:pPr>
+            <a:r>
+              <a:rPr lang="en-GB" sz="2000" dirty="0">
+                <a:latin typeface="Calibri" panose="020F0502020204030204" pitchFamily="34" charset="0"/>
+                <a:cs typeface="Calibri" panose="020F0502020204030204" pitchFamily="34" charset="0"/>
+              </a:rPr>
+              <a:t>Clang</a:t>
+            </a:r>
+          </a:p>
+          <a:p>
+            <a:pPr marL="342900" indent="-342900">
+              <a:buAutoNum type="arabicParenR"/>
+            </a:pPr>
+            <a:r>
+              <a:rPr lang="en-GB" sz="2000" dirty="0">
+                <a:latin typeface="Calibri" panose="020F0502020204030204" pitchFamily="34" charset="0"/>
+                <a:cs typeface="Calibri" panose="020F0502020204030204" pitchFamily="34" charset="0"/>
+              </a:rPr>
+              <a:t>GCC</a:t>
+            </a:r>
+            <a:endParaRPr lang="en-US" sz="2000" dirty="0">
+              <a:latin typeface="Calibri" panose="020F0502020204030204" pitchFamily="34" charset="0"/>
+              <a:cs typeface="Calibri" panose="020F0502020204030204" pitchFamily="34" charset="0"/>
+            </a:endParaRPr>
           </a:p>
         </p:txBody>
       </p:sp>

</xml_diff>